<commit_message>
From Zero to Data Science & rework Type Providers.
</commit_message>
<xml_diff>
--- a/Type Providers/Type Providers.pptx
+++ b/Type Providers/Type Providers.pptx
@@ -249,7 +249,7 @@
           <a:p>
             <a:fld id="{F81B89EF-20F4-41E1-849C-92F341F1F0A0}" type="datetimeFigureOut">
               <a:rPr lang="en-US" smtClean="0"/>
-              <a:t>4/15/2013</a:t>
+              <a:t>7/2/2013</a:t>
             </a:fld>
             <a:endParaRPr lang="en-US"/>
           </a:p>
@@ -1556,7 +1556,7 @@
             <a:fld id="{B61BEF0D-F0BB-DE4B-95CE-6DB70DBA9567}" type="datetimeFigureOut">
               <a:rPr lang="en-US"/>
               <a:pPr/>
-              <a:t>4/15/2013</a:t>
+              <a:t>7/2/2013</a:t>
             </a:fld>
             <a:endParaRPr lang="en-US" dirty="0"/>
           </a:p>
@@ -1915,7 +1915,7 @@
             <a:fld id="{B61BEF0D-F0BB-DE4B-95CE-6DB70DBA9567}" type="datetimeFigureOut">
               <a:rPr lang="en-US"/>
               <a:pPr/>
-              <a:t>4/15/2013</a:t>
+              <a:t>7/2/2013</a:t>
             </a:fld>
             <a:endParaRPr lang="en-US" dirty="0"/>
           </a:p>
@@ -2190,7 +2190,7 @@
             <a:fld id="{B61BEF0D-F0BB-DE4B-95CE-6DB70DBA9567}" type="datetimeFigureOut">
               <a:rPr lang="en-US"/>
               <a:pPr/>
-              <a:t>4/15/2013</a:t>
+              <a:t>7/2/2013</a:t>
             </a:fld>
             <a:endParaRPr lang="en-US" dirty="0"/>
           </a:p>
@@ -2512,7 +2512,7 @@
             <a:fld id="{B61BEF0D-F0BB-DE4B-95CE-6DB70DBA9567}" type="datetimeFigureOut">
               <a:rPr lang="en-US"/>
               <a:pPr/>
-              <a:t>4/15/2013</a:t>
+              <a:t>7/2/2013</a:t>
             </a:fld>
             <a:endParaRPr lang="en-US" dirty="0"/>
           </a:p>
@@ -3136,7 +3136,7 @@
             <a:fld id="{B61BEF0D-F0BB-DE4B-95CE-6DB70DBA9567}" type="datetimeFigureOut">
               <a:rPr lang="en-US"/>
               <a:pPr/>
-              <a:t>4/15/2013</a:t>
+              <a:t>7/2/2013</a:t>
             </a:fld>
             <a:endParaRPr lang="en-US" dirty="0"/>
           </a:p>
@@ -3420,7 +3420,7 @@
             <a:fld id="{B61BEF0D-F0BB-DE4B-95CE-6DB70DBA9567}" type="datetimeFigureOut">
               <a:rPr lang="en-US"/>
               <a:pPr/>
-              <a:t>4/15/2013</a:t>
+              <a:t>7/2/2013</a:t>
             </a:fld>
             <a:endParaRPr lang="en-US" dirty="0"/>
           </a:p>
@@ -4039,7 +4039,7 @@
             <a:fld id="{B61BEF0D-F0BB-DE4B-95CE-6DB70DBA9567}" type="datetimeFigureOut">
               <a:rPr lang="en-US"/>
               <a:pPr/>
-              <a:t>4/15/2013</a:t>
+              <a:t>7/2/2013</a:t>
             </a:fld>
             <a:endParaRPr lang="en-US" dirty="0"/>
           </a:p>
@@ -4333,7 +4333,7 @@
             <a:fld id="{B61BEF0D-F0BB-DE4B-95CE-6DB70DBA9567}" type="datetimeFigureOut">
               <a:rPr lang="en-US"/>
               <a:pPr/>
-              <a:t>4/15/2013</a:t>
+              <a:t>7/2/2013</a:t>
             </a:fld>
             <a:endParaRPr lang="en-US" dirty="0"/>
           </a:p>
@@ -4578,7 +4578,7 @@
             <a:fld id="{B61BEF0D-F0BB-DE4B-95CE-6DB70DBA9567}" type="datetimeFigureOut">
               <a:rPr lang="en-US"/>
               <a:pPr/>
-              <a:t>4/15/2013</a:t>
+              <a:t>7/2/2013</a:t>
             </a:fld>
             <a:endParaRPr lang="en-US" dirty="0"/>
           </a:p>
@@ -4813,7 +4813,7 @@
             <a:fld id="{B61BEF0D-F0BB-DE4B-95CE-6DB70DBA9567}" type="datetimeFigureOut">
               <a:rPr lang="en-US"/>
               <a:pPr/>
-              <a:t>4/15/2013</a:t>
+              <a:t>7/2/2013</a:t>
             </a:fld>
             <a:endParaRPr lang="en-US" dirty="0"/>
           </a:p>
@@ -5126,7 +5126,7 @@
             <a:fld id="{B61BEF0D-F0BB-DE4B-95CE-6DB70DBA9567}" type="datetimeFigureOut">
               <a:rPr lang="en-US"/>
               <a:pPr/>
-              <a:t>4/15/2013</a:t>
+              <a:t>7/2/2013</a:t>
             </a:fld>
             <a:endParaRPr lang="en-US" dirty="0"/>
           </a:p>
@@ -5483,7 +5483,7 @@
             <a:fld id="{B61BEF0D-F0BB-DE4B-95CE-6DB70DBA9567}" type="datetimeFigureOut">
               <a:rPr lang="en-US"/>
               <a:pPr/>
-              <a:t>4/15/2013</a:t>
+              <a:t>7/2/2013</a:t>
             </a:fld>
             <a:endParaRPr lang="en-US" dirty="0"/>
           </a:p>
@@ -5986,7 +5986,7 @@
             <a:fld id="{B61BEF0D-F0BB-DE4B-95CE-6DB70DBA9567}" type="datetimeFigureOut">
               <a:rPr lang="en-US"/>
               <a:pPr/>
-              <a:t>4/15/2013</a:t>
+              <a:t>7/2/2013</a:t>
             </a:fld>
             <a:endParaRPr lang="en-US" dirty="0"/>
           </a:p>
@@ -6169,7 +6169,7 @@
             <a:fld id="{B61BEF0D-F0BB-DE4B-95CE-6DB70DBA9567}" type="datetimeFigureOut">
               <a:rPr lang="en-US"/>
               <a:pPr/>
-              <a:t>4/15/2013</a:t>
+              <a:t>7/2/2013</a:t>
             </a:fld>
             <a:endParaRPr lang="en-US" dirty="0"/>
           </a:p>
@@ -6329,7 +6329,7 @@
             <a:fld id="{B61BEF0D-F0BB-DE4B-95CE-6DB70DBA9567}" type="datetimeFigureOut">
               <a:rPr lang="en-US"/>
               <a:pPr/>
-              <a:t>4/15/2013</a:t>
+              <a:t>7/2/2013</a:t>
             </a:fld>
             <a:endParaRPr lang="en-US" dirty="0"/>
           </a:p>
@@ -6639,7 +6639,7 @@
             <a:fld id="{B61BEF0D-F0BB-DE4B-95CE-6DB70DBA9567}" type="datetimeFigureOut">
               <a:rPr lang="en-US"/>
               <a:pPr/>
-              <a:t>4/15/2013</a:t>
+              <a:t>7/2/2013</a:t>
             </a:fld>
             <a:endParaRPr lang="en-US" dirty="0"/>
           </a:p>
@@ -6900,7 +6900,7 @@
             <a:fld id="{B61BEF0D-F0BB-DE4B-95CE-6DB70DBA9567}" type="datetimeFigureOut">
               <a:rPr lang="en-US"/>
               <a:pPr/>
-              <a:t>4/15/2013</a:t>
+              <a:t>7/2/2013</a:t>
             </a:fld>
             <a:endParaRPr lang="en-US" dirty="0"/>
           </a:p>
@@ -7204,7 +7204,7 @@
             <a:fld id="{B61BEF0D-F0BB-DE4B-95CE-6DB70DBA9567}" type="datetimeFigureOut">
               <a:rPr lang="en-US" smtClean="0"/>
               <a:pPr/>
-              <a:t>4/15/2013</a:t>
+              <a:t>7/2/2013</a:t>
             </a:fld>
             <a:endParaRPr lang="en-US" dirty="0"/>
           </a:p>
@@ -7847,14 +7847,22 @@
           </a:p>
           <a:p>
             <a:r>
-              <a:rPr lang="en-US" dirty="0" smtClean="0">
-                <a:hlinkClick r:id="rId5"/>
-              </a:rPr>
-              <a:t>Type Provider for .proto files</a:t>
-            </a:r>
-            <a:endParaRPr lang="en-US" dirty="0"/>
-          </a:p>
-          <a:p>
+              <a:rPr lang="en-US" dirty="0" err="1" smtClean="0"/>
+              <a:t>Matlab</a:t>
+            </a:r>
+            <a:r>
+              <a:rPr lang="en-US" dirty="0" smtClean="0"/>
+              <a:t> </a:t>
+            </a:r>
+            <a:r>
+              <a:rPr lang="en-US" smtClean="0"/>
+              <a:t>Type Provider</a:t>
+            </a:r>
+          </a:p>
+          <a:p>
+            <a:pPr marL="0" indent="0">
+              <a:buNone/>
+            </a:pPr>
             <a:endParaRPr lang="en-US" dirty="0"/>
           </a:p>
         </p:txBody>

</xml_diff>

<commit_message>
Pics of sample outcomes in case of demo fail.
</commit_message>
<xml_diff>
--- a/Type Providers/Type Providers.pptx
+++ b/Type Providers/Type Providers.pptx
@@ -18991,7 +18991,33 @@
                 <a:ea typeface="+mj-ea"/>
                 <a:cs typeface="+mj-cs"/>
               </a:rPr>
-              <a:t>A mechanism to provide types to the compiler</a:t>
+              <a:t>A mechanism to </a:t>
+            </a:r>
+            <a:r>
+              <a:rPr lang="en-US" sz="2399" b="1" dirty="0" smtClean="0">
+                <a:solidFill>
+                  <a:schemeClr val="accent4">
+                    <a:lumMod val="50000"/>
+                  </a:schemeClr>
+                </a:solidFill>
+                <a:latin typeface="Calibri Light" panose="020F0302020204030204"/>
+                <a:ea typeface="+mj-ea"/>
+                <a:cs typeface="+mj-cs"/>
+              </a:rPr>
+              <a:t>provide types </a:t>
+            </a:r>
+            <a:r>
+              <a:rPr lang="en-US" sz="2399" b="1" dirty="0">
+                <a:solidFill>
+                  <a:schemeClr val="accent4">
+                    <a:lumMod val="50000"/>
+                  </a:schemeClr>
+                </a:solidFill>
+                <a:latin typeface="Calibri Light" panose="020F0302020204030204"/>
+                <a:ea typeface="+mj-ea"/>
+                <a:cs typeface="+mj-cs"/>
+              </a:rPr>
+              <a:t>to the compiler</a:t>
             </a:r>
             <a:r>
               <a:rPr lang="en-US" sz="2399" b="1" dirty="0" smtClean="0">

</xml_diff>

<commit_message>
Cleaning up TP solution
</commit_message>
<xml_diff>
--- a/Type Providers/Type Providers.pptx
+++ b/Type Providers/Type Providers.pptx
@@ -167,6 +167,11 @@
     <p:ext uri="{EFAFB233-063F-42B5-8137-9DF3F51BA10A}">
       <p15:sldGuideLst xmlns:p15="http://schemas.microsoft.com/office/powerpoint/2012/main">
         <p15:guide id="1" pos="3383" userDrawn="1">
+          <p15:clr>
+            <a:srgbClr val="A4A3A4"/>
+          </p15:clr>
+        </p15:guide>
+        <p15:guide id="2" orient="horz" pos="2160">
           <p15:clr>
             <a:srgbClr val="A4A3A4"/>
           </p15:clr>
@@ -2847,8 +2852,8 @@
     <dgm:cxn modelId="{D56EB2D8-5FDF-4692-9920-FD79A3311815}" type="presOf" srcId="{0B1D3EB6-DDAD-4074-AD89-1328ED184427}" destId="{00C18325-64BA-4230-8D42-A8CBBE2E541A}" srcOrd="0" destOrd="0" presId="urn:microsoft.com/office/officeart/2008/layout/AlternatingPictureBlocks"/>
     <dgm:cxn modelId="{5605B05D-9DD7-4070-B3CE-BAEE4864C5BE}" type="presOf" srcId="{F48CB2E3-D8BE-404E-A0D2-EEB3E1242A50}" destId="{538C1F93-2633-4DB7-AA7D-A5DE4FC8CB5A}" srcOrd="0" destOrd="0" presId="urn:microsoft.com/office/officeart/2008/layout/AlternatingPictureBlocks"/>
     <dgm:cxn modelId="{9725BDCF-4BB2-42FD-A2FB-17C284C08CD7}" srcId="{4E1E4C3E-5D80-4250-A36F-E2D6F8CE2114}" destId="{0B1D3EB6-DDAD-4074-AD89-1328ED184427}" srcOrd="1" destOrd="0" parTransId="{A0B0BA24-7BBD-4169-A6E4-C30BE3C7D4C6}" sibTransId="{02B22490-15FC-4C3F-8863-8A3E5A29C80C}"/>
+    <dgm:cxn modelId="{DF629EDD-CDDD-4422-BD5A-CACB7A74E2A8}" srcId="{0B1D3EB6-DDAD-4074-AD89-1328ED184427}" destId="{B9CFF899-EA87-447F-8310-377F7EA336B9}" srcOrd="0" destOrd="0" parTransId="{516D0FCC-58B7-4A3F-875C-505C5BEE0B2A}" sibTransId="{DDC7F697-1D79-4A68-AD43-E40B28D1EE4E}"/>
     <dgm:cxn modelId="{B3060CEB-B955-4ABF-8714-857ED9A2A44F}" srcId="{0B1D3EB6-DDAD-4074-AD89-1328ED184427}" destId="{B5557B3C-A729-44E7-B06E-8E406FFFF1BD}" srcOrd="1" destOrd="0" parTransId="{9B0ACE6D-CF28-47A6-BE42-2EE8D0A3E2E5}" sibTransId="{138A8399-7FDA-4CA4-AB2B-D6D64FA5D682}"/>
-    <dgm:cxn modelId="{DF629EDD-CDDD-4422-BD5A-CACB7A74E2A8}" srcId="{0B1D3EB6-DDAD-4074-AD89-1328ED184427}" destId="{B9CFF899-EA87-447F-8310-377F7EA336B9}" srcOrd="0" destOrd="0" parTransId="{516D0FCC-58B7-4A3F-875C-505C5BEE0B2A}" sibTransId="{DDC7F697-1D79-4A68-AD43-E40B28D1EE4E}"/>
     <dgm:cxn modelId="{E1B13E87-781A-4F9F-97A0-C3B2392EABE4}" srcId="{4E1E4C3E-5D80-4250-A36F-E2D6F8CE2114}" destId="{F48CB2E3-D8BE-404E-A0D2-EEB3E1242A50}" srcOrd="0" destOrd="0" parTransId="{6CF4DB19-53FF-4B32-AC92-262597995234}" sibTransId="{82AB8F63-BF4E-41E3-9A9D-3BCBF2FE527C}"/>
     <dgm:cxn modelId="{3A6F834D-3602-42EA-AFA3-C4E4D706522C}" type="presOf" srcId="{B9CFF899-EA87-447F-8310-377F7EA336B9}" destId="{00C18325-64BA-4230-8D42-A8CBBE2E541A}" srcOrd="0" destOrd="1" presId="urn:microsoft.com/office/officeart/2008/layout/AlternatingPictureBlocks"/>
     <dgm:cxn modelId="{ACE51563-F509-4B08-90DE-35F8A1487771}" type="presOf" srcId="{1B025A62-D98E-488F-8749-BA0463D60F82}" destId="{00C18325-64BA-4230-8D42-A8CBBE2E541A}" srcOrd="0" destOrd="3" presId="urn:microsoft.com/office/officeart/2008/layout/AlternatingPictureBlocks"/>
@@ -3191,15 +3196,15 @@
     </dgm:pt>
   </dgm:ptLst>
   <dgm:cxnLst>
-    <dgm:cxn modelId="{D871FEB1-20AE-4F20-98A3-208C15A5DC9F}" srcId="{DD1801D1-E95C-435E-9A6B-BDB98AC6747C}" destId="{24454270-3559-47C5-882E-F0D320EC8AE3}" srcOrd="1" destOrd="0" parTransId="{E3957FDC-111F-47E2-8708-142B65842703}" sibTransId="{FA3D90DB-1FBC-4D3F-8837-0DA2EAB01539}"/>
+    <dgm:cxn modelId="{5723E59B-E7BF-4960-BCC2-11BAE55764D3}" srcId="{DD1801D1-E95C-435E-9A6B-BDB98AC6747C}" destId="{DB8B8884-907A-42CB-BA57-0748ACC33DA8}" srcOrd="0" destOrd="0" parTransId="{FC4CBBF5-2F3C-4D44-9E47-3454F3571AE2}" sibTransId="{BDF9A999-8106-4231-BE0B-5AE7BCCD01EF}"/>
     <dgm:cxn modelId="{BCA97E81-1C2C-4354-B2FA-C22A5C033259}" type="presOf" srcId="{DD1801D1-E95C-435E-9A6B-BDB98AC6747C}" destId="{F4EB06CD-2E69-4621-B27C-F32E83BFADA9}" srcOrd="0" destOrd="0" presId="urn:microsoft.com/office/officeart/2005/8/layout/hProcess9"/>
-    <dgm:cxn modelId="{DBFE924F-FB6C-4683-A204-30204396DCBA}" type="presOf" srcId="{51D6D775-156C-40B4-9D2D-10813F1F5ED1}" destId="{CD60A385-9B88-44DC-960E-2CDB3996E30E}" srcOrd="0" destOrd="0" presId="urn:microsoft.com/office/officeart/2005/8/layout/hProcess9"/>
-    <dgm:cxn modelId="{150E374A-A361-4A2B-9D4D-10FCE534835C}" srcId="{DD1801D1-E95C-435E-9A6B-BDB98AC6747C}" destId="{51D6D775-156C-40B4-9D2D-10813F1F5ED1}" srcOrd="2" destOrd="0" parTransId="{14B21A9C-6557-41E9-A03C-54A350C35567}" sibTransId="{3AF22C5B-C72C-4AE0-847E-720DCF7FC01B}"/>
-    <dgm:cxn modelId="{5723E59B-E7BF-4960-BCC2-11BAE55764D3}" srcId="{DD1801D1-E95C-435E-9A6B-BDB98AC6747C}" destId="{DB8B8884-907A-42CB-BA57-0748ACC33DA8}" srcOrd="0" destOrd="0" parTransId="{FC4CBBF5-2F3C-4D44-9E47-3454F3571AE2}" sibTransId="{BDF9A999-8106-4231-BE0B-5AE7BCCD01EF}"/>
-    <dgm:cxn modelId="{0A26BEBE-7497-4DF7-B076-601A70AA1DFA}" type="presOf" srcId="{DB8B8884-907A-42CB-BA57-0748ACC33DA8}" destId="{A5606B05-A0C0-4C29-8E8B-C69EB0594E2A}" srcOrd="0" destOrd="0" presId="urn:microsoft.com/office/officeart/2005/8/layout/hProcess9"/>
     <dgm:cxn modelId="{816C09A2-9B7B-4C81-97F9-263EE8AFF56A}" srcId="{DD1801D1-E95C-435E-9A6B-BDB98AC6747C}" destId="{F240BC77-B20F-47FF-8D53-E818EE8F11C9}" srcOrd="3" destOrd="0" parTransId="{4FF76796-F05C-410B-A5D7-1E54B8039411}" sibTransId="{3CEF9A96-025C-4780-B4E3-DE2F73BAB55D}"/>
     <dgm:cxn modelId="{D209AEDE-B67D-49B7-A09B-6A23FFD1A462}" type="presOf" srcId="{F240BC77-B20F-47FF-8D53-E818EE8F11C9}" destId="{A0DBA043-27DC-495C-B1C4-80BB13CF934D}" srcOrd="0" destOrd="0" presId="urn:microsoft.com/office/officeart/2005/8/layout/hProcess9"/>
     <dgm:cxn modelId="{64921933-5BBC-443E-8C71-B63D5E8584B9}" type="presOf" srcId="{24454270-3559-47C5-882E-F0D320EC8AE3}" destId="{64B1E964-3DC6-4415-9A5E-A83325ACA918}" srcOrd="0" destOrd="0" presId="urn:microsoft.com/office/officeart/2005/8/layout/hProcess9"/>
+    <dgm:cxn modelId="{0A26BEBE-7497-4DF7-B076-601A70AA1DFA}" type="presOf" srcId="{DB8B8884-907A-42CB-BA57-0748ACC33DA8}" destId="{A5606B05-A0C0-4C29-8E8B-C69EB0594E2A}" srcOrd="0" destOrd="0" presId="urn:microsoft.com/office/officeart/2005/8/layout/hProcess9"/>
+    <dgm:cxn modelId="{DBFE924F-FB6C-4683-A204-30204396DCBA}" type="presOf" srcId="{51D6D775-156C-40B4-9D2D-10813F1F5ED1}" destId="{CD60A385-9B88-44DC-960E-2CDB3996E30E}" srcOrd="0" destOrd="0" presId="urn:microsoft.com/office/officeart/2005/8/layout/hProcess9"/>
+    <dgm:cxn modelId="{150E374A-A361-4A2B-9D4D-10FCE534835C}" srcId="{DD1801D1-E95C-435E-9A6B-BDB98AC6747C}" destId="{51D6D775-156C-40B4-9D2D-10813F1F5ED1}" srcOrd="2" destOrd="0" parTransId="{14B21A9C-6557-41E9-A03C-54A350C35567}" sibTransId="{3AF22C5B-C72C-4AE0-847E-720DCF7FC01B}"/>
+    <dgm:cxn modelId="{D871FEB1-20AE-4F20-98A3-208C15A5DC9F}" srcId="{DD1801D1-E95C-435E-9A6B-BDB98AC6747C}" destId="{24454270-3559-47C5-882E-F0D320EC8AE3}" srcOrd="1" destOrd="0" parTransId="{E3957FDC-111F-47E2-8708-142B65842703}" sibTransId="{FA3D90DB-1FBC-4D3F-8837-0DA2EAB01539}"/>
     <dgm:cxn modelId="{0A1106E5-8F49-486F-81AE-77577FB291B6}" type="presParOf" srcId="{F4EB06CD-2E69-4621-B27C-F32E83BFADA9}" destId="{133D9D82-C18C-4E6C-BD78-CAC18A510840}" srcOrd="0" destOrd="0" presId="urn:microsoft.com/office/officeart/2005/8/layout/hProcess9"/>
     <dgm:cxn modelId="{1CC40E11-3F9D-4C54-BB0C-449D1628D561}" type="presParOf" srcId="{F4EB06CD-2E69-4621-B27C-F32E83BFADA9}" destId="{C0802C58-1B43-4D83-B2FB-B7051D0060F7}" srcOrd="1" destOrd="0" presId="urn:microsoft.com/office/officeart/2005/8/layout/hProcess9"/>
     <dgm:cxn modelId="{7D1B303D-0ECA-4B20-ACA3-C080027C4BA4}" type="presParOf" srcId="{C0802C58-1B43-4D83-B2FB-B7051D0060F7}" destId="{A5606B05-A0C0-4C29-8E8B-C69EB0594E2A}" srcOrd="0" destOrd="0" presId="urn:microsoft.com/office/officeart/2005/8/layout/hProcess9"/>
@@ -5328,417 +5333,6 @@
       <dsp:cNvGrpSpPr/>
     </dsp:nvGrpSpPr>
     <dsp:grpSpPr/>
-    <dsp:sp modelId="{538C1F93-2633-4DB7-AA7D-A5DE4FC8CB5A}">
-      <dsp:nvSpPr>
-        <dsp:cNvPr id="0" name=""/>
-        <dsp:cNvSpPr/>
-      </dsp:nvSpPr>
-      <dsp:spPr>
-        <a:xfrm>
-          <a:off x="2073862" y="315"/>
-          <a:ext cx="3748739" cy="1695495"/>
-        </a:xfrm>
-        <a:prstGeom prst="rect">
-          <a:avLst/>
-        </a:prstGeom>
-        <a:solidFill>
-          <a:schemeClr val="accent4">
-            <a:lumMod val="50000"/>
-          </a:schemeClr>
-        </a:solidFill>
-        <a:ln w="53975" cap="flat" cmpd="dbl" algn="ctr">
-          <a:solidFill>
-            <a:schemeClr val="lt1">
-              <a:hueOff val="0"/>
-              <a:satOff val="0"/>
-              <a:lumOff val="0"/>
-              <a:alphaOff val="0"/>
-            </a:schemeClr>
-          </a:solidFill>
-          <a:prstDash val="solid"/>
-        </a:ln>
-        <a:effectLst/>
-      </dsp:spPr>
-      <dsp:style>
-        <a:lnRef idx="3">
-          <a:scrgbClr r="0" g="0" b="0"/>
-        </a:lnRef>
-        <a:fillRef idx="1">
-          <a:scrgbClr r="0" g="0" b="0"/>
-        </a:fillRef>
-        <a:effectRef idx="1">
-          <a:scrgbClr r="0" g="0" b="0"/>
-        </a:effectRef>
-        <a:fontRef idx="minor">
-          <a:schemeClr val="lt1"/>
-        </a:fontRef>
-      </dsp:style>
-      <dsp:txBody>
-        <a:bodyPr spcFirstLastPara="0" vert="horz" wrap="square" lIns="76200" tIns="76200" rIns="76200" bIns="76200" numCol="1" spcCol="1270" anchor="t" anchorCtr="0">
-          <a:noAutofit/>
-        </a:bodyPr>
-        <a:lstStyle/>
-        <a:p>
-          <a:pPr lvl="0" algn="l" defTabSz="889000" rtl="0">
-            <a:lnSpc>
-              <a:spcPct val="90000"/>
-            </a:lnSpc>
-            <a:spcBef>
-              <a:spcPct val="0"/>
-            </a:spcBef>
-            <a:spcAft>
-              <a:spcPct val="35000"/>
-            </a:spcAft>
-          </a:pPr>
-          <a:r>
-            <a:rPr lang="en-US" sz="2000" b="1" kern="1200" dirty="0" smtClean="0"/>
-            <a:t>Intellisense, tooltips, &amp; other tooling available</a:t>
-          </a:r>
-          <a:endParaRPr lang="en-US" sz="2000" b="1" kern="1200" dirty="0"/>
-        </a:p>
-      </dsp:txBody>
-      <dsp:txXfrm>
-        <a:off x="2073862" y="315"/>
-        <a:ext cx="3748739" cy="1695495"/>
-      </dsp:txXfrm>
-    </dsp:sp>
-    <dsp:sp modelId="{754CBADF-7C1E-4197-9623-DE30F3C029AC}">
-      <dsp:nvSpPr>
-        <dsp:cNvPr id="0" name=""/>
-        <dsp:cNvSpPr/>
-      </dsp:nvSpPr>
-      <dsp:spPr>
-        <a:xfrm>
-          <a:off x="227468" y="315"/>
-          <a:ext cx="1678540" cy="1695495"/>
-        </a:xfrm>
-        <a:prstGeom prst="rect">
-          <a:avLst/>
-        </a:prstGeom>
-        <a:solidFill>
-          <a:schemeClr val="accent2"/>
-        </a:solidFill>
-        <a:ln w="53975" cap="flat" cmpd="dbl" algn="ctr">
-          <a:solidFill>
-            <a:schemeClr val="lt1">
-              <a:hueOff val="0"/>
-              <a:satOff val="0"/>
-              <a:lumOff val="0"/>
-              <a:alphaOff val="0"/>
-            </a:schemeClr>
-          </a:solidFill>
-          <a:prstDash val="solid"/>
-        </a:ln>
-        <a:effectLst/>
-      </dsp:spPr>
-      <dsp:style>
-        <a:lnRef idx="3">
-          <a:scrgbClr r="0" g="0" b="0"/>
-        </a:lnRef>
-        <a:fillRef idx="1">
-          <a:scrgbClr r="0" g="0" b="0"/>
-        </a:fillRef>
-        <a:effectRef idx="1">
-          <a:scrgbClr r="0" g="0" b="0"/>
-        </a:effectRef>
-        <a:fontRef idx="minor">
-          <a:schemeClr val="lt1"/>
-        </a:fontRef>
-      </dsp:style>
-    </dsp:sp>
-    <dsp:sp modelId="{00C18325-64BA-4230-8D42-A8CBBE2E541A}">
-      <dsp:nvSpPr>
-        <dsp:cNvPr id="0" name=""/>
-        <dsp:cNvSpPr/>
-      </dsp:nvSpPr>
-      <dsp:spPr>
-        <a:xfrm>
-          <a:off x="227468" y="1975566"/>
-          <a:ext cx="3748739" cy="1695495"/>
-        </a:xfrm>
-        <a:prstGeom prst="rect">
-          <a:avLst/>
-        </a:prstGeom>
-        <a:solidFill>
-          <a:schemeClr val="accent4">
-            <a:lumMod val="50000"/>
-          </a:schemeClr>
-        </a:solidFill>
-        <a:ln w="53975" cap="flat" cmpd="dbl" algn="ctr">
-          <a:solidFill>
-            <a:schemeClr val="lt1">
-              <a:hueOff val="0"/>
-              <a:satOff val="0"/>
-              <a:lumOff val="0"/>
-              <a:alphaOff val="0"/>
-            </a:schemeClr>
-          </a:solidFill>
-          <a:prstDash val="solid"/>
-        </a:ln>
-        <a:effectLst/>
-      </dsp:spPr>
-      <dsp:style>
-        <a:lnRef idx="3">
-          <a:scrgbClr r="0" g="0" b="0"/>
-        </a:lnRef>
-        <a:fillRef idx="1">
-          <a:scrgbClr r="0" g="0" b="0"/>
-        </a:fillRef>
-        <a:effectRef idx="1">
-          <a:scrgbClr r="0" g="0" b="0"/>
-        </a:effectRef>
-        <a:fontRef idx="minor">
-          <a:schemeClr val="lt1"/>
-        </a:fontRef>
-      </dsp:style>
-      <dsp:txBody>
-        <a:bodyPr spcFirstLastPara="0" vert="horz" wrap="square" lIns="76200" tIns="76200" rIns="76200" bIns="76200" numCol="1" spcCol="1270" anchor="t" anchorCtr="0">
-          <a:noAutofit/>
-        </a:bodyPr>
-        <a:lstStyle/>
-        <a:p>
-          <a:pPr lvl="0" algn="l" defTabSz="889000" rtl="0">
-            <a:lnSpc>
-              <a:spcPct val="90000"/>
-            </a:lnSpc>
-            <a:spcBef>
-              <a:spcPct val="0"/>
-            </a:spcBef>
-            <a:spcAft>
-              <a:spcPct val="35000"/>
-            </a:spcAft>
-          </a:pPr>
-          <a:r>
-            <a:rPr lang="en-US" sz="2000" b="1" kern="1200" dirty="0" smtClean="0"/>
-            <a:t>No code generation</a:t>
-          </a:r>
-          <a:endParaRPr lang="en-US" sz="2000" b="1" kern="1200" dirty="0"/>
-        </a:p>
-        <a:p>
-          <a:pPr marL="171450" lvl="1" indent="-171450" algn="l" defTabSz="800100" rtl="0">
-            <a:lnSpc>
-              <a:spcPct val="90000"/>
-            </a:lnSpc>
-            <a:spcBef>
-              <a:spcPct val="0"/>
-            </a:spcBef>
-            <a:spcAft>
-              <a:spcPct val="15000"/>
-            </a:spcAft>
-            <a:buChar char="••"/>
-          </a:pPr>
-          <a:r>
-            <a:rPr lang="en-US" sz="1800" kern="1200" dirty="0" smtClean="0"/>
-            <a:t>Always in sync with the source</a:t>
-          </a:r>
-          <a:endParaRPr lang="en-US" sz="1800" kern="1200" dirty="0"/>
-        </a:p>
-        <a:p>
-          <a:pPr marL="171450" lvl="1" indent="-171450" algn="l" defTabSz="800100" rtl="0">
-            <a:lnSpc>
-              <a:spcPct val="90000"/>
-            </a:lnSpc>
-            <a:spcBef>
-              <a:spcPct val="0"/>
-            </a:spcBef>
-            <a:spcAft>
-              <a:spcPct val="15000"/>
-            </a:spcAft>
-            <a:buChar char="••"/>
-          </a:pPr>
-          <a:r>
-            <a:rPr lang="en-US" sz="1800" kern="1200" dirty="0" smtClean="0"/>
-            <a:t>No extra bloated code</a:t>
-          </a:r>
-          <a:endParaRPr lang="en-US" sz="1800" kern="1200" dirty="0"/>
-        </a:p>
-        <a:p>
-          <a:pPr marL="171450" lvl="1" indent="-171450" algn="l" defTabSz="800100" rtl="0">
-            <a:lnSpc>
-              <a:spcPct val="90000"/>
-            </a:lnSpc>
-            <a:spcBef>
-              <a:spcPct val="0"/>
-            </a:spcBef>
-            <a:spcAft>
-              <a:spcPct val="15000"/>
-            </a:spcAft>
-            <a:buChar char="••"/>
-          </a:pPr>
-          <a:r>
-            <a:rPr lang="en-US" sz="1800" kern="1200" dirty="0" smtClean="0"/>
-            <a:t>Scalable to millions of types (e.g. - freebase)</a:t>
-          </a:r>
-          <a:endParaRPr lang="en-US" sz="1800" kern="1200" dirty="0"/>
-        </a:p>
-      </dsp:txBody>
-      <dsp:txXfrm>
-        <a:off x="227468" y="1975566"/>
-        <a:ext cx="3748739" cy="1695495"/>
-      </dsp:txXfrm>
-    </dsp:sp>
-    <dsp:sp modelId="{B732AFC3-CBCB-40BD-93FB-614BAC717596}">
-      <dsp:nvSpPr>
-        <dsp:cNvPr id="0" name=""/>
-        <dsp:cNvSpPr/>
-      </dsp:nvSpPr>
-      <dsp:spPr>
-        <a:xfrm>
-          <a:off x="4144062" y="1975566"/>
-          <a:ext cx="1678540" cy="1695495"/>
-        </a:xfrm>
-        <a:prstGeom prst="rect">
-          <a:avLst/>
-        </a:prstGeom>
-        <a:solidFill>
-          <a:schemeClr val="accent2"/>
-        </a:solidFill>
-        <a:ln w="53975" cap="flat" cmpd="dbl" algn="ctr">
-          <a:solidFill>
-            <a:schemeClr val="lt1">
-              <a:hueOff val="0"/>
-              <a:satOff val="0"/>
-              <a:lumOff val="0"/>
-              <a:alphaOff val="0"/>
-            </a:schemeClr>
-          </a:solidFill>
-          <a:prstDash val="solid"/>
-        </a:ln>
-        <a:effectLst/>
-      </dsp:spPr>
-      <dsp:style>
-        <a:lnRef idx="3">
-          <a:scrgbClr r="0" g="0" b="0"/>
-        </a:lnRef>
-        <a:fillRef idx="1">
-          <a:scrgbClr r="0" g="0" b="0"/>
-        </a:fillRef>
-        <a:effectRef idx="1">
-          <a:scrgbClr r="0" g="0" b="0"/>
-        </a:effectRef>
-        <a:fontRef idx="minor">
-          <a:schemeClr val="lt1"/>
-        </a:fontRef>
-      </dsp:style>
-    </dsp:sp>
-    <dsp:sp modelId="{056E0795-FEBC-41A8-9465-02461723C490}">
-      <dsp:nvSpPr>
-        <dsp:cNvPr id="0" name=""/>
-        <dsp:cNvSpPr/>
-      </dsp:nvSpPr>
-      <dsp:spPr>
-        <a:xfrm>
-          <a:off x="2073862" y="3950818"/>
-          <a:ext cx="3748739" cy="1695495"/>
-        </a:xfrm>
-        <a:prstGeom prst="rect">
-          <a:avLst/>
-        </a:prstGeom>
-        <a:solidFill>
-          <a:schemeClr val="accent4">
-            <a:lumMod val="50000"/>
-          </a:schemeClr>
-        </a:solidFill>
-        <a:ln w="53975" cap="flat" cmpd="dbl" algn="ctr">
-          <a:solidFill>
-            <a:schemeClr val="lt1">
-              <a:hueOff val="0"/>
-              <a:satOff val="0"/>
-              <a:lumOff val="0"/>
-              <a:alphaOff val="0"/>
-            </a:schemeClr>
-          </a:solidFill>
-          <a:prstDash val="solid"/>
-        </a:ln>
-        <a:effectLst/>
-      </dsp:spPr>
-      <dsp:style>
-        <a:lnRef idx="3">
-          <a:scrgbClr r="0" g="0" b="0"/>
-        </a:lnRef>
-        <a:fillRef idx="1">
-          <a:scrgbClr r="0" g="0" b="0"/>
-        </a:fillRef>
-        <a:effectRef idx="1">
-          <a:scrgbClr r="0" g="0" b="0"/>
-        </a:effectRef>
-        <a:fontRef idx="minor">
-          <a:schemeClr val="lt1"/>
-        </a:fontRef>
-      </dsp:style>
-      <dsp:txBody>
-        <a:bodyPr spcFirstLastPara="0" vert="horz" wrap="square" lIns="76200" tIns="76200" rIns="76200" bIns="76200" numCol="1" spcCol="1270" anchor="t" anchorCtr="0">
-          <a:noAutofit/>
-        </a:bodyPr>
-        <a:lstStyle/>
-        <a:p>
-          <a:pPr lvl="0" algn="ctr" defTabSz="889000" rtl="0">
-            <a:lnSpc>
-              <a:spcPct val="90000"/>
-            </a:lnSpc>
-            <a:spcBef>
-              <a:spcPct val="0"/>
-            </a:spcBef>
-            <a:spcAft>
-              <a:spcPct val="35000"/>
-            </a:spcAft>
-          </a:pPr>
-          <a:r>
-            <a:rPr lang="en-US" sz="2000" b="1" kern="1200" dirty="0" smtClean="0"/>
-            <a:t>More natural with REPL</a:t>
-          </a:r>
-          <a:endParaRPr lang="en-US" sz="2000" b="1" kern="1200" dirty="0"/>
-        </a:p>
-      </dsp:txBody>
-      <dsp:txXfrm>
-        <a:off x="2073862" y="3950818"/>
-        <a:ext cx="3748739" cy="1695495"/>
-      </dsp:txXfrm>
-    </dsp:sp>
-    <dsp:sp modelId="{9C693826-E8EF-40D9-9ACD-70564CCA445C}">
-      <dsp:nvSpPr>
-        <dsp:cNvPr id="0" name=""/>
-        <dsp:cNvSpPr/>
-      </dsp:nvSpPr>
-      <dsp:spPr>
-        <a:xfrm>
-          <a:off x="227468" y="3950818"/>
-          <a:ext cx="1678540" cy="1695495"/>
-        </a:xfrm>
-        <a:prstGeom prst="rect">
-          <a:avLst/>
-        </a:prstGeom>
-        <a:solidFill>
-          <a:schemeClr val="accent2"/>
-        </a:solidFill>
-        <a:ln w="53975" cap="flat" cmpd="dbl" algn="ctr">
-          <a:solidFill>
-            <a:schemeClr val="lt1">
-              <a:hueOff val="0"/>
-              <a:satOff val="0"/>
-              <a:lumOff val="0"/>
-              <a:alphaOff val="0"/>
-            </a:schemeClr>
-          </a:solidFill>
-          <a:prstDash val="solid"/>
-        </a:ln>
-        <a:effectLst/>
-      </dsp:spPr>
-      <dsp:style>
-        <a:lnRef idx="3">
-          <a:scrgbClr r="0" g="0" b="0"/>
-        </a:lnRef>
-        <a:fillRef idx="1">
-          <a:scrgbClr r="0" g="0" b="0"/>
-        </a:fillRef>
-        <a:effectRef idx="1">
-          <a:scrgbClr r="0" g="0" b="0"/>
-        </a:effectRef>
-        <a:fontRef idx="minor">
-          <a:schemeClr val="lt1"/>
-        </a:fontRef>
-      </dsp:style>
-    </dsp:sp>
   </dsp:spTree>
 </dsp:drawing>
 </file>
@@ -5751,513 +5345,6 @@
       <dsp:cNvGrpSpPr/>
     </dsp:nvGrpSpPr>
     <dsp:grpSpPr/>
-    <dsp:sp modelId="{133D9D82-C18C-4E6C-BD78-CAC18A510840}">
-      <dsp:nvSpPr>
-        <dsp:cNvPr id="0" name=""/>
-        <dsp:cNvSpPr/>
-      </dsp:nvSpPr>
-      <dsp:spPr>
-        <a:xfrm>
-          <a:off x="528168" y="0"/>
-          <a:ext cx="5985907" cy="2880424"/>
-        </a:xfrm>
-        <a:prstGeom prst="rightArrow">
-          <a:avLst/>
-        </a:prstGeom>
-        <a:gradFill rotWithShape="0">
-          <a:gsLst>
-            <a:gs pos="0">
-              <a:schemeClr val="accent2"/>
-            </a:gs>
-            <a:gs pos="11000">
-              <a:schemeClr val="accent4">
-                <a:lumMod val="50000"/>
-              </a:schemeClr>
-            </a:gs>
-            <a:gs pos="100000">
-              <a:schemeClr val="accent4">
-                <a:lumMod val="50000"/>
-              </a:schemeClr>
-            </a:gs>
-          </a:gsLst>
-          <a:path path="circle">
-            <a:fillToRect l="100000" t="100000" r="100000" b="100000"/>
-          </a:path>
-        </a:gradFill>
-        <a:ln>
-          <a:noFill/>
-        </a:ln>
-        <a:effectLst/>
-        <a:scene3d>
-          <a:camera prst="orthographicFront"/>
-          <a:lightRig rig="threePt" dir="t">
-            <a:rot lat="0" lon="0" rev="7500000"/>
-          </a:lightRig>
-        </a:scene3d>
-        <a:sp3d z="-152400" extrusionH="63500" prstMaterial="matte">
-          <a:bevelT w="144450" h="6350" prst="relaxedInset"/>
-          <a:contourClr>
-            <a:schemeClr val="bg1"/>
-          </a:contourClr>
-        </a:sp3d>
-      </dsp:spPr>
-      <dsp:style>
-        <a:lnRef idx="0">
-          <a:scrgbClr r="0" g="0" b="0"/>
-        </a:lnRef>
-        <a:fillRef idx="3">
-          <a:scrgbClr r="0" g="0" b="0"/>
-        </a:fillRef>
-        <a:effectRef idx="0">
-          <a:scrgbClr r="0" g="0" b="0"/>
-        </a:effectRef>
-        <a:fontRef idx="minor"/>
-      </dsp:style>
-    </dsp:sp>
-    <dsp:sp modelId="{A5606B05-A0C0-4C29-8E8B-C69EB0594E2A}">
-      <dsp:nvSpPr>
-        <dsp:cNvPr id="0" name=""/>
-        <dsp:cNvSpPr/>
-      </dsp:nvSpPr>
-      <dsp:spPr>
-        <a:xfrm>
-          <a:off x="62763" y="864127"/>
-          <a:ext cx="1582989" cy="1152169"/>
-        </a:xfrm>
-        <a:prstGeom prst="roundRect">
-          <a:avLst/>
-        </a:prstGeom>
-        <a:gradFill rotWithShape="0">
-          <a:gsLst>
-            <a:gs pos="0">
-              <a:schemeClr val="accent2">
-                <a:hueOff val="0"/>
-                <a:satOff val="0"/>
-                <a:lumOff val="0"/>
-                <a:alphaOff val="0"/>
-              </a:schemeClr>
-            </a:gs>
-            <a:gs pos="90000">
-              <a:schemeClr val="accent2">
-                <a:hueOff val="0"/>
-                <a:satOff val="0"/>
-                <a:lumOff val="0"/>
-                <a:alphaOff val="0"/>
-                <a:shade val="100000"/>
-                <a:satMod val="105000"/>
-              </a:schemeClr>
-            </a:gs>
-            <a:gs pos="100000">
-              <a:schemeClr val="accent2">
-                <a:hueOff val="0"/>
-                <a:satOff val="0"/>
-                <a:lumOff val="0"/>
-                <a:alphaOff val="0"/>
-                <a:shade val="80000"/>
-                <a:satMod val="120000"/>
-              </a:schemeClr>
-            </a:gs>
-          </a:gsLst>
-          <a:path path="circle">
-            <a:fillToRect l="100000" t="100000" r="100000" b="100000"/>
-          </a:path>
-        </a:gradFill>
-        <a:ln>
-          <a:noFill/>
-        </a:ln>
-        <a:effectLst>
-          <a:outerShdw blurRad="38100" dist="25400" dir="5400000" rotWithShape="0">
-            <a:srgbClr val="000000">
-              <a:alpha val="45000"/>
-            </a:srgbClr>
-          </a:outerShdw>
-        </a:effectLst>
-        <a:scene3d>
-          <a:camera prst="orthographicFront"/>
-          <a:lightRig rig="threePt" dir="t">
-            <a:rot lat="0" lon="0" rev="7500000"/>
-          </a:lightRig>
-        </a:scene3d>
-        <a:sp3d prstMaterial="plastic">
-          <a:bevelT w="127000" h="25400" prst="relaxedInset"/>
-        </a:sp3d>
-      </dsp:spPr>
-      <dsp:style>
-        <a:lnRef idx="0">
-          <a:scrgbClr r="0" g="0" b="0"/>
-        </a:lnRef>
-        <a:fillRef idx="3">
-          <a:scrgbClr r="0" g="0" b="0"/>
-        </a:fillRef>
-        <a:effectRef idx="2">
-          <a:scrgbClr r="0" g="0" b="0"/>
-        </a:effectRef>
-        <a:fontRef idx="minor">
-          <a:schemeClr val="lt1"/>
-        </a:fontRef>
-      </dsp:style>
-      <dsp:txBody>
-        <a:bodyPr spcFirstLastPara="0" vert="horz" wrap="square" lIns="76200" tIns="76200" rIns="76200" bIns="76200" numCol="1" spcCol="1270" anchor="ctr" anchorCtr="0">
-          <a:noAutofit/>
-        </a:bodyPr>
-        <a:lstStyle/>
-        <a:p>
-          <a:pPr lvl="0" algn="ctr" defTabSz="889000" rtl="0">
-            <a:lnSpc>
-              <a:spcPct val="90000"/>
-            </a:lnSpc>
-            <a:spcBef>
-              <a:spcPct val="0"/>
-            </a:spcBef>
-            <a:spcAft>
-              <a:spcPct val="35000"/>
-            </a:spcAft>
-          </a:pPr>
-          <a:r>
-            <a:rPr lang="en-US" sz="2000" b="1" kern="1200" dirty="0" smtClean="0"/>
-            <a:t>Set up connection</a:t>
-          </a:r>
-          <a:endParaRPr lang="en-US" sz="2000" b="1" kern="1200" dirty="0"/>
-        </a:p>
-      </dsp:txBody>
-      <dsp:txXfrm>
-        <a:off x="119007" y="920371"/>
-        <a:ext cx="1470501" cy="1039681"/>
-      </dsp:txXfrm>
-    </dsp:sp>
-    <dsp:sp modelId="{64B1E964-3DC6-4415-9A5E-A83325ACA918}">
-      <dsp:nvSpPr>
-        <dsp:cNvPr id="0" name=""/>
-        <dsp:cNvSpPr/>
-      </dsp:nvSpPr>
-      <dsp:spPr>
-        <a:xfrm>
-          <a:off x="1909584" y="864127"/>
-          <a:ext cx="1043861" cy="1152169"/>
-        </a:xfrm>
-        <a:prstGeom prst="roundRect">
-          <a:avLst/>
-        </a:prstGeom>
-        <a:gradFill rotWithShape="0">
-          <a:gsLst>
-            <a:gs pos="0">
-              <a:schemeClr val="accent2">
-                <a:hueOff val="0"/>
-                <a:satOff val="0"/>
-                <a:lumOff val="0"/>
-                <a:alphaOff val="0"/>
-              </a:schemeClr>
-            </a:gs>
-            <a:gs pos="90000">
-              <a:schemeClr val="accent2">
-                <a:hueOff val="0"/>
-                <a:satOff val="0"/>
-                <a:lumOff val="0"/>
-                <a:alphaOff val="0"/>
-                <a:shade val="100000"/>
-                <a:satMod val="105000"/>
-              </a:schemeClr>
-            </a:gs>
-            <a:gs pos="100000">
-              <a:schemeClr val="accent2">
-                <a:hueOff val="0"/>
-                <a:satOff val="0"/>
-                <a:lumOff val="0"/>
-                <a:alphaOff val="0"/>
-                <a:shade val="80000"/>
-                <a:satMod val="120000"/>
-              </a:schemeClr>
-            </a:gs>
-          </a:gsLst>
-          <a:path path="circle">
-            <a:fillToRect l="100000" t="100000" r="100000" b="100000"/>
-          </a:path>
-        </a:gradFill>
-        <a:ln>
-          <a:noFill/>
-        </a:ln>
-        <a:effectLst>
-          <a:outerShdw blurRad="38100" dist="25400" dir="5400000" rotWithShape="0">
-            <a:srgbClr val="000000">
-              <a:alpha val="45000"/>
-            </a:srgbClr>
-          </a:outerShdw>
-        </a:effectLst>
-        <a:scene3d>
-          <a:camera prst="orthographicFront"/>
-          <a:lightRig rig="threePt" dir="t">
-            <a:rot lat="0" lon="0" rev="7500000"/>
-          </a:lightRig>
-        </a:scene3d>
-        <a:sp3d prstMaterial="plastic">
-          <a:bevelT w="127000" h="25400" prst="relaxedInset"/>
-        </a:sp3d>
-      </dsp:spPr>
-      <dsp:style>
-        <a:lnRef idx="0">
-          <a:scrgbClr r="0" g="0" b="0"/>
-        </a:lnRef>
-        <a:fillRef idx="3">
-          <a:scrgbClr r="0" g="0" b="0"/>
-        </a:fillRef>
-        <a:effectRef idx="2">
-          <a:scrgbClr r="0" g="0" b="0"/>
-        </a:effectRef>
-        <a:fontRef idx="minor">
-          <a:schemeClr val="lt1"/>
-        </a:fontRef>
-      </dsp:style>
-      <dsp:txBody>
-        <a:bodyPr spcFirstLastPara="0" vert="horz" wrap="square" lIns="76200" tIns="76200" rIns="76200" bIns="76200" numCol="1" spcCol="1270" anchor="ctr" anchorCtr="0">
-          <a:noAutofit/>
-        </a:bodyPr>
-        <a:lstStyle/>
-        <a:p>
-          <a:pPr lvl="0" algn="ctr" defTabSz="889000" rtl="0">
-            <a:lnSpc>
-              <a:spcPct val="90000"/>
-            </a:lnSpc>
-            <a:spcBef>
-              <a:spcPct val="0"/>
-            </a:spcBef>
-            <a:spcAft>
-              <a:spcPct val="35000"/>
-            </a:spcAft>
-          </a:pPr>
-          <a:r>
-            <a:rPr lang="en-US" sz="2000" b="1" kern="1200" dirty="0" smtClean="0"/>
-            <a:t>Obtain data</a:t>
-          </a:r>
-          <a:endParaRPr lang="en-US" sz="2000" b="1" kern="1200" dirty="0"/>
-        </a:p>
-      </dsp:txBody>
-      <dsp:txXfrm>
-        <a:off x="1960541" y="915084"/>
-        <a:ext cx="941947" cy="1050255"/>
-      </dsp:txXfrm>
-    </dsp:sp>
-    <dsp:sp modelId="{CD60A385-9B88-44DC-960E-2CDB3996E30E}">
-      <dsp:nvSpPr>
-        <dsp:cNvPr id="0" name=""/>
-        <dsp:cNvSpPr/>
-      </dsp:nvSpPr>
-      <dsp:spPr>
-        <a:xfrm>
-          <a:off x="3217277" y="864127"/>
-          <a:ext cx="1859682" cy="1152169"/>
-        </a:xfrm>
-        <a:prstGeom prst="roundRect">
-          <a:avLst/>
-        </a:prstGeom>
-        <a:gradFill rotWithShape="0">
-          <a:gsLst>
-            <a:gs pos="0">
-              <a:schemeClr val="accent2">
-                <a:hueOff val="0"/>
-                <a:satOff val="0"/>
-                <a:lumOff val="0"/>
-                <a:alphaOff val="0"/>
-              </a:schemeClr>
-            </a:gs>
-            <a:gs pos="90000">
-              <a:schemeClr val="accent2">
-                <a:hueOff val="0"/>
-                <a:satOff val="0"/>
-                <a:lumOff val="0"/>
-                <a:alphaOff val="0"/>
-                <a:shade val="100000"/>
-                <a:satMod val="105000"/>
-              </a:schemeClr>
-            </a:gs>
-            <a:gs pos="100000">
-              <a:schemeClr val="accent2">
-                <a:hueOff val="0"/>
-                <a:satOff val="0"/>
-                <a:lumOff val="0"/>
-                <a:alphaOff val="0"/>
-                <a:shade val="80000"/>
-                <a:satMod val="120000"/>
-              </a:schemeClr>
-            </a:gs>
-          </a:gsLst>
-          <a:path path="circle">
-            <a:fillToRect l="100000" t="100000" r="100000" b="100000"/>
-          </a:path>
-        </a:gradFill>
-        <a:ln>
-          <a:noFill/>
-        </a:ln>
-        <a:effectLst>
-          <a:outerShdw blurRad="38100" dist="25400" dir="5400000" rotWithShape="0">
-            <a:srgbClr val="000000">
-              <a:alpha val="45000"/>
-            </a:srgbClr>
-          </a:outerShdw>
-        </a:effectLst>
-        <a:scene3d>
-          <a:camera prst="orthographicFront"/>
-          <a:lightRig rig="threePt" dir="t">
-            <a:rot lat="0" lon="0" rev="7500000"/>
-          </a:lightRig>
-        </a:scene3d>
-        <a:sp3d prstMaterial="plastic">
-          <a:bevelT w="127000" h="25400" prst="relaxedInset"/>
-        </a:sp3d>
-      </dsp:spPr>
-      <dsp:style>
-        <a:lnRef idx="0">
-          <a:scrgbClr r="0" g="0" b="0"/>
-        </a:lnRef>
-        <a:fillRef idx="3">
-          <a:scrgbClr r="0" g="0" b="0"/>
-        </a:fillRef>
-        <a:effectRef idx="2">
-          <a:scrgbClr r="0" g="0" b="0"/>
-        </a:effectRef>
-        <a:fontRef idx="minor">
-          <a:schemeClr val="lt1"/>
-        </a:fontRef>
-      </dsp:style>
-      <dsp:txBody>
-        <a:bodyPr spcFirstLastPara="0" vert="horz" wrap="square" lIns="76200" tIns="76200" rIns="76200" bIns="76200" numCol="1" spcCol="1270" anchor="ctr" anchorCtr="0">
-          <a:noAutofit/>
-        </a:bodyPr>
-        <a:lstStyle/>
-        <a:p>
-          <a:pPr lvl="0" algn="ctr" defTabSz="889000" rtl="0">
-            <a:lnSpc>
-              <a:spcPct val="90000"/>
-            </a:lnSpc>
-            <a:spcBef>
-              <a:spcPct val="0"/>
-            </a:spcBef>
-            <a:spcAft>
-              <a:spcPct val="35000"/>
-            </a:spcAft>
-          </a:pPr>
-          <a:r>
-            <a:rPr lang="en-US" sz="2000" b="1" kern="1200" dirty="0" smtClean="0"/>
-            <a:t>Create infrastructure</a:t>
-          </a:r>
-          <a:endParaRPr lang="en-US" sz="2000" b="1" kern="1200" dirty="0"/>
-        </a:p>
-      </dsp:txBody>
-      <dsp:txXfrm>
-        <a:off x="3273521" y="920371"/>
-        <a:ext cx="1747194" cy="1039681"/>
-      </dsp:txXfrm>
-    </dsp:sp>
-    <dsp:sp modelId="{A0DBA043-27DC-495C-B1C4-80BB13CF934D}">
-      <dsp:nvSpPr>
-        <dsp:cNvPr id="0" name=""/>
-        <dsp:cNvSpPr/>
-      </dsp:nvSpPr>
-      <dsp:spPr>
-        <a:xfrm>
-          <a:off x="5340791" y="864127"/>
-          <a:ext cx="1638688" cy="1152169"/>
-        </a:xfrm>
-        <a:prstGeom prst="roundRect">
-          <a:avLst/>
-        </a:prstGeom>
-        <a:gradFill rotWithShape="0">
-          <a:gsLst>
-            <a:gs pos="0">
-              <a:schemeClr val="accent2">
-                <a:hueOff val="0"/>
-                <a:satOff val="0"/>
-                <a:lumOff val="0"/>
-                <a:alphaOff val="0"/>
-              </a:schemeClr>
-            </a:gs>
-            <a:gs pos="90000">
-              <a:schemeClr val="accent2">
-                <a:hueOff val="0"/>
-                <a:satOff val="0"/>
-                <a:lumOff val="0"/>
-                <a:alphaOff val="0"/>
-                <a:shade val="100000"/>
-                <a:satMod val="105000"/>
-              </a:schemeClr>
-            </a:gs>
-            <a:gs pos="100000">
-              <a:schemeClr val="accent2">
-                <a:hueOff val="0"/>
-                <a:satOff val="0"/>
-                <a:lumOff val="0"/>
-                <a:alphaOff val="0"/>
-                <a:shade val="80000"/>
-                <a:satMod val="120000"/>
-              </a:schemeClr>
-            </a:gs>
-          </a:gsLst>
-          <a:path path="circle">
-            <a:fillToRect l="100000" t="100000" r="100000" b="100000"/>
-          </a:path>
-        </a:gradFill>
-        <a:ln>
-          <a:noFill/>
-        </a:ln>
-        <a:effectLst>
-          <a:outerShdw blurRad="38100" dist="25400" dir="5400000" rotWithShape="0">
-            <a:srgbClr val="000000">
-              <a:alpha val="45000"/>
-            </a:srgbClr>
-          </a:outerShdw>
-        </a:effectLst>
-        <a:scene3d>
-          <a:camera prst="orthographicFront"/>
-          <a:lightRig rig="threePt" dir="t">
-            <a:rot lat="0" lon="0" rev="7500000"/>
-          </a:lightRig>
-        </a:scene3d>
-        <a:sp3d prstMaterial="plastic">
-          <a:bevelT w="127000" h="25400" prst="relaxedInset"/>
-        </a:sp3d>
-      </dsp:spPr>
-      <dsp:style>
-        <a:lnRef idx="0">
-          <a:scrgbClr r="0" g="0" b="0"/>
-        </a:lnRef>
-        <a:fillRef idx="3">
-          <a:scrgbClr r="0" g="0" b="0"/>
-        </a:fillRef>
-        <a:effectRef idx="2">
-          <a:scrgbClr r="0" g="0" b="0"/>
-        </a:effectRef>
-        <a:fontRef idx="minor">
-          <a:schemeClr val="lt1"/>
-        </a:fontRef>
-      </dsp:style>
-      <dsp:txBody>
-        <a:bodyPr spcFirstLastPara="0" vert="horz" wrap="square" lIns="76200" tIns="76200" rIns="76200" bIns="76200" numCol="1" spcCol="1270" anchor="ctr" anchorCtr="0">
-          <a:noAutofit/>
-        </a:bodyPr>
-        <a:lstStyle/>
-        <a:p>
-          <a:pPr lvl="0" algn="ctr" defTabSz="889000" rtl="0">
-            <a:lnSpc>
-              <a:spcPct val="90000"/>
-            </a:lnSpc>
-            <a:spcBef>
-              <a:spcPct val="0"/>
-            </a:spcBef>
-            <a:spcAft>
-              <a:spcPct val="35000"/>
-            </a:spcAft>
-          </a:pPr>
-          <a:r>
-            <a:rPr lang="en-US" sz="2000" b="1" kern="1200" dirty="0" smtClean="0"/>
-            <a:t>Actually consume data</a:t>
-          </a:r>
-          <a:endParaRPr lang="en-US" sz="2000" b="1" kern="1200" dirty="0"/>
-        </a:p>
-      </dsp:txBody>
-      <dsp:txXfrm>
-        <a:off x="5397035" y="920371"/>
-        <a:ext cx="1526200" cy="1039681"/>
-      </dsp:txXfrm>
-    </dsp:sp>
   </dsp:spTree>
 </dsp:drawing>
 </file>
@@ -6270,2264 +5357,6 @@
       <dsp:cNvGrpSpPr/>
     </dsp:nvGrpSpPr>
     <dsp:grpSpPr/>
-    <dsp:sp modelId="{1388C9D4-43DF-41FA-B2EB-A2141A262C3F}">
-      <dsp:nvSpPr>
-        <dsp:cNvPr id="0" name=""/>
-        <dsp:cNvSpPr/>
-      </dsp:nvSpPr>
-      <dsp:spPr>
-        <a:xfrm>
-          <a:off x="518464" y="2160"/>
-          <a:ext cx="970649" cy="582389"/>
-        </a:xfrm>
-        <a:prstGeom prst="rect">
-          <a:avLst/>
-        </a:prstGeom>
-        <a:solidFill>
-          <a:schemeClr val="accent2"/>
-        </a:solidFill>
-        <a:ln w="19050" cap="flat" cmpd="sng" algn="ctr">
-          <a:solidFill>
-            <a:schemeClr val="lt1">
-              <a:hueOff val="0"/>
-              <a:satOff val="0"/>
-              <a:lumOff val="0"/>
-              <a:alphaOff val="0"/>
-            </a:schemeClr>
-          </a:solidFill>
-          <a:prstDash val="solid"/>
-        </a:ln>
-        <a:effectLst/>
-      </dsp:spPr>
-      <dsp:style>
-        <a:lnRef idx="2">
-          <a:scrgbClr r="0" g="0" b="0"/>
-        </a:lnRef>
-        <a:fillRef idx="1">
-          <a:scrgbClr r="0" g="0" b="0"/>
-        </a:fillRef>
-        <a:effectRef idx="0">
-          <a:scrgbClr r="0" g="0" b="0"/>
-        </a:effectRef>
-        <a:fontRef idx="minor">
-          <a:schemeClr val="lt1"/>
-        </a:fontRef>
-      </dsp:style>
-      <dsp:txBody>
-        <a:bodyPr spcFirstLastPara="0" vert="horz" wrap="square" lIns="53340" tIns="53340" rIns="53340" bIns="53340" numCol="1" spcCol="1270" anchor="ctr" anchorCtr="0">
-          <a:noAutofit/>
-        </a:bodyPr>
-        <a:lstStyle/>
-        <a:p>
-          <a:pPr lvl="0" algn="ctr" defTabSz="622300" rtl="0">
-            <a:lnSpc>
-              <a:spcPct val="90000"/>
-            </a:lnSpc>
-            <a:spcBef>
-              <a:spcPct val="0"/>
-            </a:spcBef>
-            <a:spcAft>
-              <a:spcPct val="35000"/>
-            </a:spcAft>
-          </a:pPr>
-          <a:r>
-            <a:rPr lang="en-US" sz="1400" kern="1200" baseline="0" dirty="0" smtClean="0">
-              <a:solidFill>
-                <a:schemeClr val="bg1"/>
-              </a:solidFill>
-              <a:hlinkClick xmlns:r="http://schemas.openxmlformats.org/officeDocument/2006/relationships" r:id="rId1"/>
-            </a:rPr>
-            <a:t>powershell</a:t>
-          </a:r>
-          <a:endParaRPr lang="en-US" sz="1400" kern="1200" baseline="0" dirty="0">
-            <a:solidFill>
-              <a:schemeClr val="bg1"/>
-            </a:solidFill>
-          </a:endParaRPr>
-        </a:p>
-      </dsp:txBody>
-      <dsp:txXfrm>
-        <a:off x="518464" y="2160"/>
-        <a:ext cx="970649" cy="582389"/>
-      </dsp:txXfrm>
-    </dsp:sp>
-    <dsp:sp modelId="{DEF38988-93B3-44CC-9130-76FF57549860}">
-      <dsp:nvSpPr>
-        <dsp:cNvPr id="0" name=""/>
-        <dsp:cNvSpPr/>
-      </dsp:nvSpPr>
-      <dsp:spPr>
-        <a:xfrm>
-          <a:off x="1586179" y="2160"/>
-          <a:ext cx="970649" cy="582389"/>
-        </a:xfrm>
-        <a:prstGeom prst="rect">
-          <a:avLst/>
-        </a:prstGeom>
-        <a:solidFill>
-          <a:schemeClr val="accent2"/>
-        </a:solidFill>
-        <a:ln w="19050" cap="flat" cmpd="sng" algn="ctr">
-          <a:solidFill>
-            <a:schemeClr val="lt1">
-              <a:hueOff val="0"/>
-              <a:satOff val="0"/>
-              <a:lumOff val="0"/>
-              <a:alphaOff val="0"/>
-            </a:schemeClr>
-          </a:solidFill>
-          <a:prstDash val="solid"/>
-        </a:ln>
-        <a:effectLst/>
-      </dsp:spPr>
-      <dsp:style>
-        <a:lnRef idx="2">
-          <a:scrgbClr r="0" g="0" b="0"/>
-        </a:lnRef>
-        <a:fillRef idx="1">
-          <a:scrgbClr r="0" g="0" b="0"/>
-        </a:fillRef>
-        <a:effectRef idx="0">
-          <a:scrgbClr r="0" g="0" b="0"/>
-        </a:effectRef>
-        <a:fontRef idx="minor">
-          <a:schemeClr val="lt1"/>
-        </a:fontRef>
-      </dsp:style>
-      <dsp:txBody>
-        <a:bodyPr spcFirstLastPara="0" vert="horz" wrap="square" lIns="91440" tIns="91440" rIns="91440" bIns="91440" numCol="1" spcCol="1270" anchor="ctr" anchorCtr="0">
-          <a:noAutofit/>
-        </a:bodyPr>
-        <a:lstStyle/>
-        <a:p>
-          <a:pPr lvl="0" algn="ctr" defTabSz="1066800" rtl="0">
-            <a:lnSpc>
-              <a:spcPct val="90000"/>
-            </a:lnSpc>
-            <a:spcBef>
-              <a:spcPct val="0"/>
-            </a:spcBef>
-            <a:spcAft>
-              <a:spcPct val="35000"/>
-            </a:spcAft>
-          </a:pPr>
-          <a:r>
-            <a:rPr lang="en-US" sz="2400" kern="1200" baseline="0" dirty="0" smtClean="0">
-              <a:solidFill>
-                <a:schemeClr val="bg1"/>
-              </a:solidFill>
-              <a:hlinkClick xmlns:r="http://schemas.openxmlformats.org/officeDocument/2006/relationships" r:id="rId2"/>
-            </a:rPr>
-            <a:t>Azure</a:t>
-          </a:r>
-          <a:endParaRPr lang="en-US" sz="2400" kern="1200" baseline="0" dirty="0">
-            <a:solidFill>
-              <a:schemeClr val="bg1"/>
-            </a:solidFill>
-          </a:endParaRPr>
-        </a:p>
-      </dsp:txBody>
-      <dsp:txXfrm>
-        <a:off x="1586179" y="2160"/>
-        <a:ext cx="970649" cy="582389"/>
-      </dsp:txXfrm>
-    </dsp:sp>
-    <dsp:sp modelId="{0F664ED1-9E15-4A36-8E6F-8AFB7799F781}">
-      <dsp:nvSpPr>
-        <dsp:cNvPr id="0" name=""/>
-        <dsp:cNvSpPr/>
-      </dsp:nvSpPr>
-      <dsp:spPr>
-        <a:xfrm>
-          <a:off x="2653893" y="2160"/>
-          <a:ext cx="970649" cy="582389"/>
-        </a:xfrm>
-        <a:prstGeom prst="rect">
-          <a:avLst/>
-        </a:prstGeom>
-        <a:solidFill>
-          <a:schemeClr val="accent2"/>
-        </a:solidFill>
-        <a:ln w="19050" cap="flat" cmpd="sng" algn="ctr">
-          <a:solidFill>
-            <a:schemeClr val="lt1">
-              <a:hueOff val="0"/>
-              <a:satOff val="0"/>
-              <a:lumOff val="0"/>
-              <a:alphaOff val="0"/>
-            </a:schemeClr>
-          </a:solidFill>
-          <a:prstDash val="solid"/>
-        </a:ln>
-        <a:effectLst/>
-      </dsp:spPr>
-      <dsp:style>
-        <a:lnRef idx="2">
-          <a:scrgbClr r="0" g="0" b="0"/>
-        </a:lnRef>
-        <a:fillRef idx="1">
-          <a:scrgbClr r="0" g="0" b="0"/>
-        </a:fillRef>
-        <a:effectRef idx="0">
-          <a:scrgbClr r="0" g="0" b="0"/>
-        </a:effectRef>
-        <a:fontRef idx="minor">
-          <a:schemeClr val="lt1"/>
-        </a:fontRef>
-      </dsp:style>
-      <dsp:txBody>
-        <a:bodyPr spcFirstLastPara="0" vert="horz" wrap="square" lIns="45720" tIns="45720" rIns="45720" bIns="45720" numCol="1" spcCol="1270" anchor="ctr" anchorCtr="0">
-          <a:noAutofit/>
-        </a:bodyPr>
-        <a:lstStyle/>
-        <a:p>
-          <a:pPr lvl="0" algn="ctr" defTabSz="533400" rtl="0">
-            <a:lnSpc>
-              <a:spcPct val="90000"/>
-            </a:lnSpc>
-            <a:spcBef>
-              <a:spcPct val="0"/>
-            </a:spcBef>
-            <a:spcAft>
-              <a:spcPct val="35000"/>
-            </a:spcAft>
-          </a:pPr>
-          <a:r>
-            <a:rPr lang="en-US" sz="1200" kern="1200" baseline="0" dirty="0" smtClean="0">
-              <a:solidFill>
-                <a:schemeClr val="bg1"/>
-              </a:solidFill>
-              <a:hlinkClick xmlns:r="http://schemas.openxmlformats.org/officeDocument/2006/relationships" r:id="rId3"/>
-            </a:rPr>
-            <a:t>Choose your own adventure</a:t>
-          </a:r>
-          <a:endParaRPr lang="en-US" sz="1200" kern="1200" baseline="0" dirty="0">
-            <a:solidFill>
-              <a:schemeClr val="bg1"/>
-            </a:solidFill>
-          </a:endParaRPr>
-        </a:p>
-      </dsp:txBody>
-      <dsp:txXfrm>
-        <a:off x="2653893" y="2160"/>
-        <a:ext cx="970649" cy="582389"/>
-      </dsp:txXfrm>
-    </dsp:sp>
-    <dsp:sp modelId="{68595508-6B7C-41BF-B427-CA8030A3B6DD}">
-      <dsp:nvSpPr>
-        <dsp:cNvPr id="0" name=""/>
-        <dsp:cNvSpPr/>
-      </dsp:nvSpPr>
-      <dsp:spPr>
-        <a:xfrm>
-          <a:off x="3721608" y="2160"/>
-          <a:ext cx="970649" cy="582389"/>
-        </a:xfrm>
-        <a:prstGeom prst="rect">
-          <a:avLst/>
-        </a:prstGeom>
-        <a:solidFill>
-          <a:schemeClr val="accent2"/>
-        </a:solidFill>
-        <a:ln w="19050" cap="flat" cmpd="sng" algn="ctr">
-          <a:solidFill>
-            <a:schemeClr val="lt1">
-              <a:hueOff val="0"/>
-              <a:satOff val="0"/>
-              <a:lumOff val="0"/>
-              <a:alphaOff val="0"/>
-            </a:schemeClr>
-          </a:solidFill>
-          <a:prstDash val="solid"/>
-        </a:ln>
-        <a:effectLst/>
-      </dsp:spPr>
-      <dsp:style>
-        <a:lnRef idx="2">
-          <a:scrgbClr r="0" g="0" b="0"/>
-        </a:lnRef>
-        <a:fillRef idx="1">
-          <a:scrgbClr r="0" g="0" b="0"/>
-        </a:fillRef>
-        <a:effectRef idx="0">
-          <a:scrgbClr r="0" g="0" b="0"/>
-        </a:effectRef>
-        <a:fontRef idx="minor">
-          <a:schemeClr val="lt1"/>
-        </a:fontRef>
-      </dsp:style>
-      <dsp:txBody>
-        <a:bodyPr spcFirstLastPara="0" vert="horz" wrap="square" lIns="80010" tIns="80010" rIns="80010" bIns="80010" numCol="1" spcCol="1270" anchor="ctr" anchorCtr="0">
-          <a:noAutofit/>
-        </a:bodyPr>
-        <a:lstStyle/>
-        <a:p>
-          <a:pPr lvl="0" algn="ctr" defTabSz="933450" rtl="0">
-            <a:lnSpc>
-              <a:spcPct val="90000"/>
-            </a:lnSpc>
-            <a:spcBef>
-              <a:spcPct val="0"/>
-            </a:spcBef>
-            <a:spcAft>
-              <a:spcPct val="35000"/>
-            </a:spcAft>
-          </a:pPr>
-          <a:r>
-            <a:rPr lang="en-US" sz="2100" kern="1200" baseline="0" dirty="0" smtClean="0">
-              <a:solidFill>
-                <a:schemeClr val="bg1"/>
-              </a:solidFill>
-              <a:hlinkClick xmlns:r="http://schemas.openxmlformats.org/officeDocument/2006/relationships" r:id="rId4"/>
-            </a:rPr>
-            <a:t>Matlab</a:t>
-          </a:r>
-          <a:endParaRPr lang="en-US" sz="2100" kern="1200" baseline="0" dirty="0">
-            <a:solidFill>
-              <a:schemeClr val="bg1"/>
-            </a:solidFill>
-          </a:endParaRPr>
-        </a:p>
-      </dsp:txBody>
-      <dsp:txXfrm>
-        <a:off x="3721608" y="2160"/>
-        <a:ext cx="970649" cy="582389"/>
-      </dsp:txXfrm>
-    </dsp:sp>
-    <dsp:sp modelId="{81654458-C405-4341-8C38-1872C057BFB4}">
-      <dsp:nvSpPr>
-        <dsp:cNvPr id="0" name=""/>
-        <dsp:cNvSpPr/>
-      </dsp:nvSpPr>
-      <dsp:spPr>
-        <a:xfrm>
-          <a:off x="518464" y="681615"/>
-          <a:ext cx="970649" cy="582389"/>
-        </a:xfrm>
-        <a:prstGeom prst="rect">
-          <a:avLst/>
-        </a:prstGeom>
-        <a:solidFill>
-          <a:schemeClr val="accent2"/>
-        </a:solidFill>
-        <a:ln w="19050" cap="flat" cmpd="sng" algn="ctr">
-          <a:solidFill>
-            <a:schemeClr val="lt1">
-              <a:hueOff val="0"/>
-              <a:satOff val="0"/>
-              <a:lumOff val="0"/>
-              <a:alphaOff val="0"/>
-            </a:schemeClr>
-          </a:solidFill>
-          <a:prstDash val="solid"/>
-        </a:ln>
-        <a:effectLst/>
-      </dsp:spPr>
-      <dsp:style>
-        <a:lnRef idx="2">
-          <a:scrgbClr r="0" g="0" b="0"/>
-        </a:lnRef>
-        <a:fillRef idx="1">
-          <a:scrgbClr r="0" g="0" b="0"/>
-        </a:fillRef>
-        <a:effectRef idx="0">
-          <a:scrgbClr r="0" g="0" b="0"/>
-        </a:effectRef>
-        <a:fontRef idx="minor">
-          <a:schemeClr val="lt1"/>
-        </a:fontRef>
-      </dsp:style>
-      <dsp:txBody>
-        <a:bodyPr spcFirstLastPara="0" vert="horz" wrap="square" lIns="121920" tIns="121920" rIns="121920" bIns="121920" numCol="1" spcCol="1270" anchor="ctr" anchorCtr="0">
-          <a:noAutofit/>
-        </a:bodyPr>
-        <a:lstStyle/>
-        <a:p>
-          <a:pPr lvl="0" algn="ctr" defTabSz="1422400" rtl="0">
-            <a:lnSpc>
-              <a:spcPct val="90000"/>
-            </a:lnSpc>
-            <a:spcBef>
-              <a:spcPct val="0"/>
-            </a:spcBef>
-            <a:spcAft>
-              <a:spcPct val="35000"/>
-            </a:spcAft>
-          </a:pPr>
-          <a:r>
-            <a:rPr lang="en-US" sz="3200" kern="1200" baseline="0" dirty="0" smtClean="0">
-              <a:solidFill>
-                <a:schemeClr val="bg1"/>
-              </a:solidFill>
-              <a:hlinkClick xmlns:r="http://schemas.openxmlformats.org/officeDocument/2006/relationships" r:id="rId5"/>
-            </a:rPr>
-            <a:t>RSS</a:t>
-          </a:r>
-          <a:endParaRPr lang="en-US" sz="3200" kern="1200" baseline="0" dirty="0">
-            <a:solidFill>
-              <a:schemeClr val="bg1"/>
-            </a:solidFill>
-          </a:endParaRPr>
-        </a:p>
-      </dsp:txBody>
-      <dsp:txXfrm>
-        <a:off x="518464" y="681615"/>
-        <a:ext cx="970649" cy="582389"/>
-      </dsp:txXfrm>
-    </dsp:sp>
-    <dsp:sp modelId="{34FDB0CA-EA4F-4BFE-96D1-0E54D0B880A9}">
-      <dsp:nvSpPr>
-        <dsp:cNvPr id="0" name=""/>
-        <dsp:cNvSpPr/>
-      </dsp:nvSpPr>
-      <dsp:spPr>
-        <a:xfrm>
-          <a:off x="1586179" y="681615"/>
-          <a:ext cx="970649" cy="582389"/>
-        </a:xfrm>
-        <a:prstGeom prst="rect">
-          <a:avLst/>
-        </a:prstGeom>
-        <a:solidFill>
-          <a:schemeClr val="accent2"/>
-        </a:solidFill>
-        <a:ln w="19050" cap="flat" cmpd="sng" algn="ctr">
-          <a:solidFill>
-            <a:schemeClr val="lt1">
-              <a:hueOff val="0"/>
-              <a:satOff val="0"/>
-              <a:lumOff val="0"/>
-              <a:alphaOff val="0"/>
-            </a:schemeClr>
-          </a:solidFill>
-          <a:prstDash val="solid"/>
-        </a:ln>
-        <a:effectLst/>
-      </dsp:spPr>
-      <dsp:style>
-        <a:lnRef idx="2">
-          <a:scrgbClr r="0" g="0" b="0"/>
-        </a:lnRef>
-        <a:fillRef idx="1">
-          <a:scrgbClr r="0" g="0" b="0"/>
-        </a:fillRef>
-        <a:effectRef idx="0">
-          <a:scrgbClr r="0" g="0" b="0"/>
-        </a:effectRef>
-        <a:fontRef idx="minor">
-          <a:schemeClr val="lt1"/>
-        </a:fontRef>
-      </dsp:style>
-      <dsp:txBody>
-        <a:bodyPr spcFirstLastPara="0" vert="horz" wrap="square" lIns="87630" tIns="87630" rIns="87630" bIns="87630" numCol="1" spcCol="1270" anchor="ctr" anchorCtr="0">
-          <a:noAutofit/>
-        </a:bodyPr>
-        <a:lstStyle/>
-        <a:p>
-          <a:pPr lvl="0" algn="ctr" defTabSz="1022350" rtl="0">
-            <a:lnSpc>
-              <a:spcPct val="90000"/>
-            </a:lnSpc>
-            <a:spcBef>
-              <a:spcPct val="0"/>
-            </a:spcBef>
-            <a:spcAft>
-              <a:spcPct val="35000"/>
-            </a:spcAft>
-          </a:pPr>
-          <a:r>
-            <a:rPr lang="en-US" sz="2300" kern="1200" baseline="0" dirty="0" smtClean="0">
-              <a:solidFill>
-                <a:schemeClr val="bg1"/>
-              </a:solidFill>
-            </a:rPr>
-            <a:t>DBML</a:t>
-          </a:r>
-          <a:endParaRPr lang="en-US" sz="2300" kern="1200" baseline="0" dirty="0">
-            <a:solidFill>
-              <a:schemeClr val="bg1"/>
-            </a:solidFill>
-          </a:endParaRPr>
-        </a:p>
-      </dsp:txBody>
-      <dsp:txXfrm>
-        <a:off x="1586179" y="681615"/>
-        <a:ext cx="970649" cy="582389"/>
-      </dsp:txXfrm>
-    </dsp:sp>
-    <dsp:sp modelId="{54788F00-332C-4CF5-93F0-38CA61254BEF}">
-      <dsp:nvSpPr>
-        <dsp:cNvPr id="0" name=""/>
-        <dsp:cNvSpPr/>
-      </dsp:nvSpPr>
-      <dsp:spPr>
-        <a:xfrm>
-          <a:off x="2653893" y="681615"/>
-          <a:ext cx="970649" cy="582389"/>
-        </a:xfrm>
-        <a:prstGeom prst="rect">
-          <a:avLst/>
-        </a:prstGeom>
-        <a:solidFill>
-          <a:schemeClr val="accent2"/>
-        </a:solidFill>
-        <a:ln w="19050" cap="flat" cmpd="sng" algn="ctr">
-          <a:solidFill>
-            <a:schemeClr val="lt1">
-              <a:hueOff val="0"/>
-              <a:satOff val="0"/>
-              <a:lumOff val="0"/>
-              <a:alphaOff val="0"/>
-            </a:schemeClr>
-          </a:solidFill>
-          <a:prstDash val="solid"/>
-        </a:ln>
-        <a:effectLst/>
-      </dsp:spPr>
-      <dsp:style>
-        <a:lnRef idx="2">
-          <a:scrgbClr r="0" g="0" b="0"/>
-        </a:lnRef>
-        <a:fillRef idx="1">
-          <a:scrgbClr r="0" g="0" b="0"/>
-        </a:fillRef>
-        <a:effectRef idx="0">
-          <a:scrgbClr r="0" g="0" b="0"/>
-        </a:effectRef>
-        <a:fontRef idx="minor">
-          <a:schemeClr val="lt1"/>
-        </a:fontRef>
-      </dsp:style>
-      <dsp:txBody>
-        <a:bodyPr spcFirstLastPara="0" vert="horz" wrap="square" lIns="76200" tIns="76200" rIns="76200" bIns="76200" numCol="1" spcCol="1270" anchor="ctr" anchorCtr="0">
-          <a:noAutofit/>
-        </a:bodyPr>
-        <a:lstStyle/>
-        <a:p>
-          <a:pPr lvl="0" algn="ctr" defTabSz="889000" rtl="0">
-            <a:lnSpc>
-              <a:spcPct val="90000"/>
-            </a:lnSpc>
-            <a:spcBef>
-              <a:spcPct val="0"/>
-            </a:spcBef>
-            <a:spcAft>
-              <a:spcPct val="35000"/>
-            </a:spcAft>
-          </a:pPr>
-          <a:r>
-            <a:rPr lang="en-US" sz="2000" kern="1200" baseline="0" dirty="0" smtClean="0">
-              <a:solidFill>
-                <a:schemeClr val="bg1"/>
-              </a:solidFill>
-            </a:rPr>
-            <a:t>EDMX</a:t>
-          </a:r>
-          <a:endParaRPr lang="en-US" sz="2000" kern="1200" baseline="0" dirty="0">
-            <a:solidFill>
-              <a:schemeClr val="bg1"/>
-            </a:solidFill>
-          </a:endParaRPr>
-        </a:p>
-      </dsp:txBody>
-      <dsp:txXfrm>
-        <a:off x="2653893" y="681615"/>
-        <a:ext cx="970649" cy="582389"/>
-      </dsp:txXfrm>
-    </dsp:sp>
-    <dsp:sp modelId="{CB127872-49AA-4652-BCC7-A57D81980281}">
-      <dsp:nvSpPr>
-        <dsp:cNvPr id="0" name=""/>
-        <dsp:cNvSpPr/>
-      </dsp:nvSpPr>
-      <dsp:spPr>
-        <a:xfrm>
-          <a:off x="3721608" y="681615"/>
-          <a:ext cx="970649" cy="582389"/>
-        </a:xfrm>
-        <a:prstGeom prst="rect">
-          <a:avLst/>
-        </a:prstGeom>
-        <a:solidFill>
-          <a:schemeClr val="accent2"/>
-        </a:solidFill>
-        <a:ln w="19050" cap="flat" cmpd="sng" algn="ctr">
-          <a:solidFill>
-            <a:schemeClr val="lt1">
-              <a:hueOff val="0"/>
-              <a:satOff val="0"/>
-              <a:lumOff val="0"/>
-              <a:alphaOff val="0"/>
-            </a:schemeClr>
-          </a:solidFill>
-          <a:prstDash val="solid"/>
-        </a:ln>
-        <a:effectLst/>
-      </dsp:spPr>
-      <dsp:style>
-        <a:lnRef idx="2">
-          <a:scrgbClr r="0" g="0" b="0"/>
-        </a:lnRef>
-        <a:fillRef idx="1">
-          <a:scrgbClr r="0" g="0" b="0"/>
-        </a:fillRef>
-        <a:effectRef idx="0">
-          <a:scrgbClr r="0" g="0" b="0"/>
-        </a:effectRef>
-        <a:fontRef idx="minor">
-          <a:schemeClr val="lt1"/>
-        </a:fontRef>
-      </dsp:style>
-      <dsp:txBody>
-        <a:bodyPr spcFirstLastPara="0" vert="horz" wrap="square" lIns="76200" tIns="76200" rIns="76200" bIns="76200" numCol="1" spcCol="1270" anchor="ctr" anchorCtr="0">
-          <a:noAutofit/>
-        </a:bodyPr>
-        <a:lstStyle/>
-        <a:p>
-          <a:pPr lvl="0" algn="ctr" defTabSz="889000">
-            <a:lnSpc>
-              <a:spcPct val="90000"/>
-            </a:lnSpc>
-            <a:spcBef>
-              <a:spcPct val="0"/>
-            </a:spcBef>
-            <a:spcAft>
-              <a:spcPct val="35000"/>
-            </a:spcAft>
-          </a:pPr>
-          <a:r>
-            <a:rPr lang="en-US" sz="2000" kern="1200" baseline="0" dirty="0" smtClean="0">
-              <a:solidFill>
-                <a:schemeClr val="bg1"/>
-              </a:solidFill>
-              <a:hlinkClick xmlns:r="http://schemas.openxmlformats.org/officeDocument/2006/relationships" r:id="rId6"/>
-            </a:rPr>
-            <a:t>SignalR</a:t>
-          </a:r>
-          <a:endParaRPr lang="en-US" sz="2000" kern="1200" dirty="0"/>
-        </a:p>
-      </dsp:txBody>
-      <dsp:txXfrm>
-        <a:off x="3721608" y="681615"/>
-        <a:ext cx="970649" cy="582389"/>
-      </dsp:txXfrm>
-    </dsp:sp>
-    <dsp:sp modelId="{FA328A23-B0DA-44BF-8005-52DA03D7449F}">
-      <dsp:nvSpPr>
-        <dsp:cNvPr id="0" name=""/>
-        <dsp:cNvSpPr/>
-      </dsp:nvSpPr>
-      <dsp:spPr>
-        <a:xfrm>
-          <a:off x="518464" y="1361070"/>
-          <a:ext cx="970649" cy="582389"/>
-        </a:xfrm>
-        <a:prstGeom prst="rect">
-          <a:avLst/>
-        </a:prstGeom>
-        <a:solidFill>
-          <a:schemeClr val="accent2"/>
-        </a:solidFill>
-        <a:ln w="19050" cap="flat" cmpd="sng" algn="ctr">
-          <a:solidFill>
-            <a:schemeClr val="lt1">
-              <a:hueOff val="0"/>
-              <a:satOff val="0"/>
-              <a:lumOff val="0"/>
-              <a:alphaOff val="0"/>
-            </a:schemeClr>
-          </a:solidFill>
-          <a:prstDash val="solid"/>
-        </a:ln>
-        <a:effectLst/>
-      </dsp:spPr>
-      <dsp:style>
-        <a:lnRef idx="2">
-          <a:scrgbClr r="0" g="0" b="0"/>
-        </a:lnRef>
-        <a:fillRef idx="1">
-          <a:scrgbClr r="0" g="0" b="0"/>
-        </a:fillRef>
-        <a:effectRef idx="0">
-          <a:scrgbClr r="0" g="0" b="0"/>
-        </a:effectRef>
-        <a:fontRef idx="minor">
-          <a:schemeClr val="lt1"/>
-        </a:fontRef>
-      </dsp:style>
-      <dsp:txBody>
-        <a:bodyPr spcFirstLastPara="0" vert="horz" wrap="square" lIns="60960" tIns="60960" rIns="60960" bIns="60960" numCol="1" spcCol="1270" anchor="ctr" anchorCtr="0">
-          <a:noAutofit/>
-        </a:bodyPr>
-        <a:lstStyle/>
-        <a:p>
-          <a:pPr lvl="0" algn="ctr" defTabSz="711200" rtl="0">
-            <a:lnSpc>
-              <a:spcPct val="90000"/>
-            </a:lnSpc>
-            <a:spcBef>
-              <a:spcPct val="0"/>
-            </a:spcBef>
-            <a:spcAft>
-              <a:spcPct val="35000"/>
-            </a:spcAft>
-          </a:pPr>
-          <a:r>
-            <a:rPr lang="en-US" sz="1600" kern="1200" baseline="0" dirty="0" smtClean="0">
-              <a:solidFill>
-                <a:schemeClr val="bg1"/>
-              </a:solidFill>
-              <a:hlinkClick xmlns:r="http://schemas.openxmlformats.org/officeDocument/2006/relationships" r:id="rId7"/>
-            </a:rPr>
-            <a:t>FunScript</a:t>
-          </a:r>
-          <a:endParaRPr lang="en-US" sz="1600" kern="1200" baseline="0" dirty="0">
-            <a:solidFill>
-              <a:schemeClr val="bg1"/>
-            </a:solidFill>
-          </a:endParaRPr>
-        </a:p>
-      </dsp:txBody>
-      <dsp:txXfrm>
-        <a:off x="518464" y="1361070"/>
-        <a:ext cx="970649" cy="582389"/>
-      </dsp:txXfrm>
-    </dsp:sp>
-    <dsp:sp modelId="{D83F89E9-4A45-44B3-AC02-4867E5F9D4CD}">
-      <dsp:nvSpPr>
-        <dsp:cNvPr id="0" name=""/>
-        <dsp:cNvSpPr/>
-      </dsp:nvSpPr>
-      <dsp:spPr>
-        <a:xfrm>
-          <a:off x="1586179" y="1361070"/>
-          <a:ext cx="970649" cy="582389"/>
-        </a:xfrm>
-        <a:prstGeom prst="rect">
-          <a:avLst/>
-        </a:prstGeom>
-        <a:solidFill>
-          <a:schemeClr val="accent2"/>
-        </a:solidFill>
-        <a:ln w="19050" cap="flat" cmpd="sng" algn="ctr">
-          <a:solidFill>
-            <a:schemeClr val="lt1">
-              <a:hueOff val="0"/>
-              <a:satOff val="0"/>
-              <a:lumOff val="0"/>
-              <a:alphaOff val="0"/>
-            </a:schemeClr>
-          </a:solidFill>
-          <a:prstDash val="solid"/>
-        </a:ln>
-        <a:effectLst/>
-      </dsp:spPr>
-      <dsp:style>
-        <a:lnRef idx="2">
-          <a:scrgbClr r="0" g="0" b="0"/>
-        </a:lnRef>
-        <a:fillRef idx="1">
-          <a:scrgbClr r="0" g="0" b="0"/>
-        </a:fillRef>
-        <a:effectRef idx="0">
-          <a:scrgbClr r="0" g="0" b="0"/>
-        </a:effectRef>
-        <a:fontRef idx="minor">
-          <a:schemeClr val="lt1"/>
-        </a:fontRef>
-      </dsp:style>
-      <dsp:txBody>
-        <a:bodyPr spcFirstLastPara="0" vert="horz" wrap="square" lIns="175260" tIns="175260" rIns="175260" bIns="175260" numCol="1" spcCol="1270" anchor="ctr" anchorCtr="0">
-          <a:noAutofit/>
-        </a:bodyPr>
-        <a:lstStyle/>
-        <a:p>
-          <a:pPr lvl="0" algn="ctr" defTabSz="2044700" rtl="0">
-            <a:lnSpc>
-              <a:spcPct val="90000"/>
-            </a:lnSpc>
-            <a:spcBef>
-              <a:spcPct val="0"/>
-            </a:spcBef>
-            <a:spcAft>
-              <a:spcPct val="35000"/>
-            </a:spcAft>
-          </a:pPr>
-          <a:r>
-            <a:rPr lang="en-US" sz="4600" kern="1200" baseline="0" dirty="0" smtClean="0">
-              <a:solidFill>
-                <a:schemeClr val="bg1"/>
-              </a:solidFill>
-              <a:hlinkClick xmlns:r="http://schemas.openxmlformats.org/officeDocument/2006/relationships" r:id="rId8"/>
-            </a:rPr>
-            <a:t>R</a:t>
-          </a:r>
-          <a:endParaRPr lang="en-US" sz="4600" kern="1200" baseline="0" dirty="0">
-            <a:solidFill>
-              <a:schemeClr val="bg1"/>
-            </a:solidFill>
-          </a:endParaRPr>
-        </a:p>
-      </dsp:txBody>
-      <dsp:txXfrm>
-        <a:off x="1586179" y="1361070"/>
-        <a:ext cx="970649" cy="582389"/>
-      </dsp:txXfrm>
-    </dsp:sp>
-    <dsp:sp modelId="{F894333E-0685-4941-BBEF-1EFEA4922A96}">
-      <dsp:nvSpPr>
-        <dsp:cNvPr id="0" name=""/>
-        <dsp:cNvSpPr/>
-      </dsp:nvSpPr>
-      <dsp:spPr>
-        <a:xfrm>
-          <a:off x="2653893" y="1361070"/>
-          <a:ext cx="970649" cy="582389"/>
-        </a:xfrm>
-        <a:prstGeom prst="rect">
-          <a:avLst/>
-        </a:prstGeom>
-        <a:solidFill>
-          <a:schemeClr val="accent2"/>
-        </a:solidFill>
-        <a:ln w="19050" cap="flat" cmpd="sng" algn="ctr">
-          <a:solidFill>
-            <a:schemeClr val="lt1">
-              <a:hueOff val="0"/>
-              <a:satOff val="0"/>
-              <a:lumOff val="0"/>
-              <a:alphaOff val="0"/>
-            </a:schemeClr>
-          </a:solidFill>
-          <a:prstDash val="solid"/>
-        </a:ln>
-        <a:effectLst/>
-      </dsp:spPr>
-      <dsp:style>
-        <a:lnRef idx="2">
-          <a:scrgbClr r="0" g="0" b="0"/>
-        </a:lnRef>
-        <a:fillRef idx="1">
-          <a:scrgbClr r="0" g="0" b="0"/>
-        </a:fillRef>
-        <a:effectRef idx="0">
-          <a:scrgbClr r="0" g="0" b="0"/>
-        </a:effectRef>
-        <a:fontRef idx="minor">
-          <a:schemeClr val="lt1"/>
-        </a:fontRef>
-      </dsp:style>
-      <dsp:txBody>
-        <a:bodyPr spcFirstLastPara="0" vert="horz" wrap="square" lIns="76200" tIns="76200" rIns="76200" bIns="76200" numCol="1" spcCol="1270" anchor="ctr" anchorCtr="0">
-          <a:noAutofit/>
-        </a:bodyPr>
-        <a:lstStyle/>
-        <a:p>
-          <a:pPr lvl="0" algn="ctr" defTabSz="889000" rtl="0">
-            <a:lnSpc>
-              <a:spcPct val="90000"/>
-            </a:lnSpc>
-            <a:spcBef>
-              <a:spcPct val="0"/>
-            </a:spcBef>
-            <a:spcAft>
-              <a:spcPct val="35000"/>
-            </a:spcAft>
-          </a:pPr>
-          <a:r>
-            <a:rPr lang="en-US" sz="2000" kern="1200" baseline="0" dirty="0" smtClean="0">
-              <a:solidFill>
-                <a:schemeClr val="bg1"/>
-              </a:solidFill>
-              <a:hlinkClick xmlns:r="http://schemas.openxmlformats.org/officeDocument/2006/relationships" r:id="rId9"/>
-            </a:rPr>
-            <a:t>Python</a:t>
-          </a:r>
-          <a:endParaRPr lang="en-US" sz="2000" kern="1200" baseline="0" dirty="0">
-            <a:solidFill>
-              <a:schemeClr val="bg1"/>
-            </a:solidFill>
-          </a:endParaRPr>
-        </a:p>
-      </dsp:txBody>
-      <dsp:txXfrm>
-        <a:off x="2653893" y="1361070"/>
-        <a:ext cx="970649" cy="582389"/>
-      </dsp:txXfrm>
-    </dsp:sp>
-    <dsp:sp modelId="{2595A267-D970-4104-BFFE-400172540BBA}">
-      <dsp:nvSpPr>
-        <dsp:cNvPr id="0" name=""/>
-        <dsp:cNvSpPr/>
-      </dsp:nvSpPr>
-      <dsp:spPr>
-        <a:xfrm>
-          <a:off x="3721608" y="1361070"/>
-          <a:ext cx="970649" cy="582389"/>
-        </a:xfrm>
-        <a:prstGeom prst="rect">
-          <a:avLst/>
-        </a:prstGeom>
-        <a:solidFill>
-          <a:schemeClr val="accent2"/>
-        </a:solidFill>
-        <a:ln w="19050" cap="flat" cmpd="sng" algn="ctr">
-          <a:solidFill>
-            <a:schemeClr val="lt1">
-              <a:hueOff val="0"/>
-              <a:satOff val="0"/>
-              <a:lumOff val="0"/>
-              <a:alphaOff val="0"/>
-            </a:schemeClr>
-          </a:solidFill>
-          <a:prstDash val="solid"/>
-        </a:ln>
-        <a:effectLst/>
-      </dsp:spPr>
-      <dsp:style>
-        <a:lnRef idx="2">
-          <a:scrgbClr r="0" g="0" b="0"/>
-        </a:lnRef>
-        <a:fillRef idx="1">
-          <a:scrgbClr r="0" g="0" b="0"/>
-        </a:fillRef>
-        <a:effectRef idx="0">
-          <a:scrgbClr r="0" g="0" b="0"/>
-        </a:effectRef>
-        <a:fontRef idx="minor">
-          <a:schemeClr val="lt1"/>
-        </a:fontRef>
-      </dsp:style>
-      <dsp:txBody>
-        <a:bodyPr spcFirstLastPara="0" vert="horz" wrap="square" lIns="45720" tIns="45720" rIns="45720" bIns="45720" numCol="1" spcCol="1270" anchor="ctr" anchorCtr="0">
-          <a:noAutofit/>
-        </a:bodyPr>
-        <a:lstStyle/>
-        <a:p>
-          <a:pPr lvl="0" algn="ctr" defTabSz="533400" rtl="0">
-            <a:lnSpc>
-              <a:spcPct val="90000"/>
-            </a:lnSpc>
-            <a:spcBef>
-              <a:spcPct val="0"/>
-            </a:spcBef>
-            <a:spcAft>
-              <a:spcPct val="35000"/>
-            </a:spcAft>
-          </a:pPr>
-          <a:r>
-            <a:rPr lang="en-US" sz="1200" kern="1200" baseline="0" dirty="0" smtClean="0">
-              <a:solidFill>
-                <a:schemeClr val="bg1"/>
-              </a:solidFill>
-              <a:hlinkClick xmlns:r="http://schemas.openxmlformats.org/officeDocument/2006/relationships" r:id="rId10"/>
-            </a:rPr>
-            <a:t>MS Dynamics CRM</a:t>
-          </a:r>
-          <a:endParaRPr lang="en-US" sz="1200" kern="1200" baseline="0" dirty="0">
-            <a:solidFill>
-              <a:schemeClr val="bg1"/>
-            </a:solidFill>
-          </a:endParaRPr>
-        </a:p>
-      </dsp:txBody>
-      <dsp:txXfrm>
-        <a:off x="3721608" y="1361070"/>
-        <a:ext cx="970649" cy="582389"/>
-      </dsp:txXfrm>
-    </dsp:sp>
-    <dsp:sp modelId="{3283098E-8035-4644-B0A0-F5E9B8671307}">
-      <dsp:nvSpPr>
-        <dsp:cNvPr id="0" name=""/>
-        <dsp:cNvSpPr/>
-      </dsp:nvSpPr>
-      <dsp:spPr>
-        <a:xfrm>
-          <a:off x="518464" y="2040525"/>
-          <a:ext cx="970649" cy="582389"/>
-        </a:xfrm>
-        <a:prstGeom prst="rect">
-          <a:avLst/>
-        </a:prstGeom>
-        <a:solidFill>
-          <a:schemeClr val="accent2"/>
-        </a:solidFill>
-        <a:ln w="19050" cap="flat" cmpd="sng" algn="ctr">
-          <a:solidFill>
-            <a:schemeClr val="lt1">
-              <a:hueOff val="0"/>
-              <a:satOff val="0"/>
-              <a:lumOff val="0"/>
-              <a:alphaOff val="0"/>
-            </a:schemeClr>
-          </a:solidFill>
-          <a:prstDash val="solid"/>
-        </a:ln>
-        <a:effectLst/>
-      </dsp:spPr>
-      <dsp:style>
-        <a:lnRef idx="2">
-          <a:scrgbClr r="0" g="0" b="0"/>
-        </a:lnRef>
-        <a:fillRef idx="1">
-          <a:scrgbClr r="0" g="0" b="0"/>
-        </a:fillRef>
-        <a:effectRef idx="0">
-          <a:scrgbClr r="0" g="0" b="0"/>
-        </a:effectRef>
-        <a:fontRef idx="minor">
-          <a:schemeClr val="lt1"/>
-        </a:fontRef>
-      </dsp:style>
-      <dsp:txBody>
-        <a:bodyPr spcFirstLastPara="0" vert="horz" wrap="square" lIns="68580" tIns="68580" rIns="68580" bIns="68580" numCol="1" spcCol="1270" anchor="ctr" anchorCtr="0">
-          <a:noAutofit/>
-        </a:bodyPr>
-        <a:lstStyle/>
-        <a:p>
-          <a:pPr lvl="0" algn="ctr" defTabSz="800100" rtl="0">
-            <a:lnSpc>
-              <a:spcPct val="90000"/>
-            </a:lnSpc>
-            <a:spcBef>
-              <a:spcPct val="0"/>
-            </a:spcBef>
-            <a:spcAft>
-              <a:spcPct val="35000"/>
-            </a:spcAft>
-          </a:pPr>
-          <a:r>
-            <a:rPr lang="en-US" sz="1800" kern="1200" baseline="0" dirty="0" smtClean="0">
-              <a:solidFill>
-                <a:schemeClr val="bg1"/>
-              </a:solidFill>
-              <a:hlinkClick xmlns:r="http://schemas.openxmlformats.org/officeDocument/2006/relationships" r:id="rId11"/>
-            </a:rPr>
-            <a:t>World Bank</a:t>
-          </a:r>
-          <a:endParaRPr lang="en-US" sz="1800" kern="1200" baseline="0" dirty="0">
-            <a:solidFill>
-              <a:schemeClr val="bg1"/>
-            </a:solidFill>
-          </a:endParaRPr>
-        </a:p>
-      </dsp:txBody>
-      <dsp:txXfrm>
-        <a:off x="518464" y="2040525"/>
-        <a:ext cx="970649" cy="582389"/>
-      </dsp:txXfrm>
-    </dsp:sp>
-    <dsp:sp modelId="{8C4399B4-19DE-494A-93D3-99E22C330D97}">
-      <dsp:nvSpPr>
-        <dsp:cNvPr id="0" name=""/>
-        <dsp:cNvSpPr/>
-      </dsp:nvSpPr>
-      <dsp:spPr>
-        <a:xfrm>
-          <a:off x="1586179" y="2040525"/>
-          <a:ext cx="970649" cy="582389"/>
-        </a:xfrm>
-        <a:prstGeom prst="rect">
-          <a:avLst/>
-        </a:prstGeom>
-        <a:solidFill>
-          <a:schemeClr val="accent2"/>
-        </a:solidFill>
-        <a:ln w="19050" cap="flat" cmpd="sng" algn="ctr">
-          <a:solidFill>
-            <a:schemeClr val="lt1">
-              <a:hueOff val="0"/>
-              <a:satOff val="0"/>
-              <a:lumOff val="0"/>
-              <a:alphaOff val="0"/>
-            </a:schemeClr>
-          </a:solidFill>
-          <a:prstDash val="solid"/>
-        </a:ln>
-        <a:effectLst/>
-      </dsp:spPr>
-      <dsp:style>
-        <a:lnRef idx="2">
-          <a:scrgbClr r="0" g="0" b="0"/>
-        </a:lnRef>
-        <a:fillRef idx="1">
-          <a:scrgbClr r="0" g="0" b="0"/>
-        </a:fillRef>
-        <a:effectRef idx="0">
-          <a:scrgbClr r="0" g="0" b="0"/>
-        </a:effectRef>
-        <a:fontRef idx="minor">
-          <a:schemeClr val="lt1"/>
-        </a:fontRef>
-      </dsp:style>
-      <dsp:txBody>
-        <a:bodyPr spcFirstLastPara="0" vert="horz" wrap="square" lIns="91440" tIns="91440" rIns="91440" bIns="91440" numCol="1" spcCol="1270" anchor="ctr" anchorCtr="0">
-          <a:noAutofit/>
-        </a:bodyPr>
-        <a:lstStyle/>
-        <a:p>
-          <a:pPr lvl="0" algn="ctr" defTabSz="1066800" rtl="0">
-            <a:lnSpc>
-              <a:spcPct val="90000"/>
-            </a:lnSpc>
-            <a:spcBef>
-              <a:spcPct val="0"/>
-            </a:spcBef>
-            <a:spcAft>
-              <a:spcPct val="35000"/>
-            </a:spcAft>
-          </a:pPr>
-          <a:r>
-            <a:rPr lang="en-US" sz="2400" kern="1200" baseline="0" dirty="0" smtClean="0">
-              <a:solidFill>
-                <a:schemeClr val="bg1"/>
-              </a:solidFill>
-            </a:rPr>
-            <a:t>Regex</a:t>
-          </a:r>
-          <a:endParaRPr lang="en-US" sz="2400" kern="1200" baseline="0" dirty="0">
-            <a:solidFill>
-              <a:schemeClr val="bg1"/>
-            </a:solidFill>
-          </a:endParaRPr>
-        </a:p>
-      </dsp:txBody>
-      <dsp:txXfrm>
-        <a:off x="1586179" y="2040525"/>
-        <a:ext cx="970649" cy="582389"/>
-      </dsp:txXfrm>
-    </dsp:sp>
-    <dsp:sp modelId="{60541CEA-E5E3-43AC-B7FA-C7AFCEE266F4}">
-      <dsp:nvSpPr>
-        <dsp:cNvPr id="0" name=""/>
-        <dsp:cNvSpPr/>
-      </dsp:nvSpPr>
-      <dsp:spPr>
-        <a:xfrm>
-          <a:off x="2653893" y="2040525"/>
-          <a:ext cx="970649" cy="582389"/>
-        </a:xfrm>
-        <a:prstGeom prst="rect">
-          <a:avLst/>
-        </a:prstGeom>
-        <a:solidFill>
-          <a:schemeClr val="accent2"/>
-        </a:solidFill>
-        <a:ln w="19050" cap="flat" cmpd="sng" algn="ctr">
-          <a:solidFill>
-            <a:schemeClr val="lt1">
-              <a:hueOff val="0"/>
-              <a:satOff val="0"/>
-              <a:lumOff val="0"/>
-              <a:alphaOff val="0"/>
-            </a:schemeClr>
-          </a:solidFill>
-          <a:prstDash val="solid"/>
-        </a:ln>
-        <a:effectLst/>
-      </dsp:spPr>
-      <dsp:style>
-        <a:lnRef idx="2">
-          <a:scrgbClr r="0" g="0" b="0"/>
-        </a:lnRef>
-        <a:fillRef idx="1">
-          <a:scrgbClr r="0" g="0" b="0"/>
-        </a:fillRef>
-        <a:effectRef idx="0">
-          <a:scrgbClr r="0" g="0" b="0"/>
-        </a:effectRef>
-        <a:fontRef idx="minor">
-          <a:schemeClr val="lt1"/>
-        </a:fontRef>
-      </dsp:style>
-      <dsp:txBody>
-        <a:bodyPr spcFirstLastPara="0" vert="horz" wrap="square" lIns="60960" tIns="60960" rIns="60960" bIns="60960" numCol="1" spcCol="1270" anchor="ctr" anchorCtr="0">
-          <a:noAutofit/>
-        </a:bodyPr>
-        <a:lstStyle/>
-        <a:p>
-          <a:pPr lvl="0" algn="ctr" defTabSz="711200" rtl="0">
-            <a:lnSpc>
-              <a:spcPct val="90000"/>
-            </a:lnSpc>
-            <a:spcBef>
-              <a:spcPct val="0"/>
-            </a:spcBef>
-            <a:spcAft>
-              <a:spcPct val="35000"/>
-            </a:spcAft>
-          </a:pPr>
-          <a:r>
-            <a:rPr lang="en-US" sz="1600" kern="1200" baseline="0" dirty="0" smtClean="0">
-              <a:solidFill>
-                <a:schemeClr val="bg1"/>
-              </a:solidFill>
-              <a:hlinkClick xmlns:r="http://schemas.openxmlformats.org/officeDocument/2006/relationships" r:id="rId12"/>
-            </a:rPr>
-            <a:t>Freebase</a:t>
-          </a:r>
-          <a:endParaRPr lang="en-US" sz="1600" kern="1200" baseline="0" dirty="0">
-            <a:solidFill>
-              <a:schemeClr val="bg1"/>
-            </a:solidFill>
-          </a:endParaRPr>
-        </a:p>
-      </dsp:txBody>
-      <dsp:txXfrm>
-        <a:off x="2653893" y="2040525"/>
-        <a:ext cx="970649" cy="582389"/>
-      </dsp:txXfrm>
-    </dsp:sp>
-    <dsp:sp modelId="{C615881B-37D3-49C3-B16B-5B1B0F5F13D4}">
-      <dsp:nvSpPr>
-        <dsp:cNvPr id="0" name=""/>
-        <dsp:cNvSpPr/>
-      </dsp:nvSpPr>
-      <dsp:spPr>
-        <a:xfrm>
-          <a:off x="3721608" y="2040525"/>
-          <a:ext cx="970649" cy="582389"/>
-        </a:xfrm>
-        <a:prstGeom prst="rect">
-          <a:avLst/>
-        </a:prstGeom>
-        <a:solidFill>
-          <a:schemeClr val="accent2"/>
-        </a:solidFill>
-        <a:ln w="19050" cap="flat" cmpd="sng" algn="ctr">
-          <a:solidFill>
-            <a:schemeClr val="lt1">
-              <a:hueOff val="0"/>
-              <a:satOff val="0"/>
-              <a:lumOff val="0"/>
-              <a:alphaOff val="0"/>
-            </a:schemeClr>
-          </a:solidFill>
-          <a:prstDash val="solid"/>
-        </a:ln>
-        <a:effectLst/>
-      </dsp:spPr>
-      <dsp:style>
-        <a:lnRef idx="2">
-          <a:scrgbClr r="0" g="0" b="0"/>
-        </a:lnRef>
-        <a:fillRef idx="1">
-          <a:scrgbClr r="0" g="0" b="0"/>
-        </a:fillRef>
-        <a:effectRef idx="0">
-          <a:scrgbClr r="0" g="0" b="0"/>
-        </a:effectRef>
-        <a:fontRef idx="minor">
-          <a:schemeClr val="lt1"/>
-        </a:fontRef>
-      </dsp:style>
-      <dsp:txBody>
-        <a:bodyPr spcFirstLastPara="0" vert="horz" wrap="square" lIns="121920" tIns="121920" rIns="121920" bIns="121920" numCol="1" spcCol="1270" anchor="ctr" anchorCtr="0">
-          <a:noAutofit/>
-        </a:bodyPr>
-        <a:lstStyle/>
-        <a:p>
-          <a:pPr lvl="0" algn="ctr" defTabSz="1422400" rtl="0">
-            <a:lnSpc>
-              <a:spcPct val="90000"/>
-            </a:lnSpc>
-            <a:spcBef>
-              <a:spcPct val="0"/>
-            </a:spcBef>
-            <a:spcAft>
-              <a:spcPct val="35000"/>
-            </a:spcAft>
-          </a:pPr>
-          <a:r>
-            <a:rPr lang="en-US" sz="3200" kern="1200" baseline="0" dirty="0" smtClean="0">
-              <a:solidFill>
-                <a:schemeClr val="bg1"/>
-              </a:solidFill>
-              <a:hlinkClick xmlns:r="http://schemas.openxmlformats.org/officeDocument/2006/relationships" r:id="rId13"/>
-            </a:rPr>
-            <a:t>CSV</a:t>
-          </a:r>
-          <a:endParaRPr lang="en-US" sz="3200" kern="1200" baseline="0" dirty="0">
-            <a:solidFill>
-              <a:schemeClr val="bg1"/>
-            </a:solidFill>
-          </a:endParaRPr>
-        </a:p>
-      </dsp:txBody>
-      <dsp:txXfrm>
-        <a:off x="3721608" y="2040525"/>
-        <a:ext cx="970649" cy="582389"/>
-      </dsp:txXfrm>
-    </dsp:sp>
-    <dsp:sp modelId="{582C1DC7-FE13-4BD2-83F5-E678FF21599B}">
-      <dsp:nvSpPr>
-        <dsp:cNvPr id="0" name=""/>
-        <dsp:cNvSpPr/>
-      </dsp:nvSpPr>
-      <dsp:spPr>
-        <a:xfrm>
-          <a:off x="518464" y="2719979"/>
-          <a:ext cx="970649" cy="582389"/>
-        </a:xfrm>
-        <a:prstGeom prst="rect">
-          <a:avLst/>
-        </a:prstGeom>
-        <a:solidFill>
-          <a:schemeClr val="accent2"/>
-        </a:solidFill>
-        <a:ln w="19050" cap="flat" cmpd="sng" algn="ctr">
-          <a:solidFill>
-            <a:schemeClr val="lt1">
-              <a:hueOff val="0"/>
-              <a:satOff val="0"/>
-              <a:lumOff val="0"/>
-              <a:alphaOff val="0"/>
-            </a:schemeClr>
-          </a:solidFill>
-          <a:prstDash val="solid"/>
-        </a:ln>
-        <a:effectLst/>
-      </dsp:spPr>
-      <dsp:style>
-        <a:lnRef idx="2">
-          <a:scrgbClr r="0" g="0" b="0"/>
-        </a:lnRef>
-        <a:fillRef idx="1">
-          <a:scrgbClr r="0" g="0" b="0"/>
-        </a:fillRef>
-        <a:effectRef idx="0">
-          <a:scrgbClr r="0" g="0" b="0"/>
-        </a:effectRef>
-        <a:fontRef idx="minor">
-          <a:schemeClr val="lt1"/>
-        </a:fontRef>
-      </dsp:style>
-      <dsp:txBody>
-        <a:bodyPr spcFirstLastPara="0" vert="horz" wrap="square" lIns="91440" tIns="91440" rIns="91440" bIns="91440" numCol="1" spcCol="1270" anchor="ctr" anchorCtr="0">
-          <a:noAutofit/>
-        </a:bodyPr>
-        <a:lstStyle/>
-        <a:p>
-          <a:pPr lvl="0" algn="ctr" defTabSz="1066800" rtl="0">
-            <a:lnSpc>
-              <a:spcPct val="90000"/>
-            </a:lnSpc>
-            <a:spcBef>
-              <a:spcPct val="0"/>
-            </a:spcBef>
-            <a:spcAft>
-              <a:spcPct val="35000"/>
-            </a:spcAft>
-          </a:pPr>
-          <a:r>
-            <a:rPr lang="en-US" sz="2400" kern="1200" baseline="0" dirty="0" smtClean="0">
-              <a:solidFill>
-                <a:schemeClr val="bg1"/>
-              </a:solidFill>
-              <a:hlinkClick xmlns:r="http://schemas.openxmlformats.org/officeDocument/2006/relationships" r:id="rId14"/>
-            </a:rPr>
-            <a:t>JSON</a:t>
-          </a:r>
-          <a:endParaRPr lang="en-US" sz="2400" kern="1200" baseline="0" dirty="0">
-            <a:solidFill>
-              <a:schemeClr val="bg1"/>
-            </a:solidFill>
-          </a:endParaRPr>
-        </a:p>
-      </dsp:txBody>
-      <dsp:txXfrm>
-        <a:off x="518464" y="2719979"/>
-        <a:ext cx="970649" cy="582389"/>
-      </dsp:txXfrm>
-    </dsp:sp>
-    <dsp:sp modelId="{03C93693-2A33-4C85-8AE6-190C6E36D59B}">
-      <dsp:nvSpPr>
-        <dsp:cNvPr id="0" name=""/>
-        <dsp:cNvSpPr/>
-      </dsp:nvSpPr>
-      <dsp:spPr>
-        <a:xfrm>
-          <a:off x="1586179" y="2719979"/>
-          <a:ext cx="970649" cy="582389"/>
-        </a:xfrm>
-        <a:prstGeom prst="rect">
-          <a:avLst/>
-        </a:prstGeom>
-        <a:solidFill>
-          <a:schemeClr val="accent2"/>
-        </a:solidFill>
-        <a:ln w="19050" cap="flat" cmpd="sng" algn="ctr">
-          <a:solidFill>
-            <a:schemeClr val="lt1">
-              <a:hueOff val="0"/>
-              <a:satOff val="0"/>
-              <a:lumOff val="0"/>
-              <a:alphaOff val="0"/>
-            </a:schemeClr>
-          </a:solidFill>
-          <a:prstDash val="solid"/>
-        </a:ln>
-        <a:effectLst/>
-      </dsp:spPr>
-      <dsp:style>
-        <a:lnRef idx="2">
-          <a:scrgbClr r="0" g="0" b="0"/>
-        </a:lnRef>
-        <a:fillRef idx="1">
-          <a:scrgbClr r="0" g="0" b="0"/>
-        </a:fillRef>
-        <a:effectRef idx="0">
-          <a:scrgbClr r="0" g="0" b="0"/>
-        </a:effectRef>
-        <a:fontRef idx="minor">
-          <a:schemeClr val="lt1"/>
-        </a:fontRef>
-      </dsp:style>
-      <dsp:txBody>
-        <a:bodyPr spcFirstLastPara="0" vert="horz" wrap="square" lIns="114300" tIns="114300" rIns="114300" bIns="114300" numCol="1" spcCol="1270" anchor="ctr" anchorCtr="0">
-          <a:noAutofit/>
-        </a:bodyPr>
-        <a:lstStyle/>
-        <a:p>
-          <a:pPr lvl="0" algn="ctr" defTabSz="1333500" rtl="0">
-            <a:lnSpc>
-              <a:spcPct val="90000"/>
-            </a:lnSpc>
-            <a:spcBef>
-              <a:spcPct val="0"/>
-            </a:spcBef>
-            <a:spcAft>
-              <a:spcPct val="35000"/>
-            </a:spcAft>
-          </a:pPr>
-          <a:r>
-            <a:rPr lang="en-US" sz="3000" kern="1200" baseline="0" dirty="0" smtClean="0">
-              <a:solidFill>
-                <a:schemeClr val="bg1"/>
-              </a:solidFill>
-              <a:hlinkClick xmlns:r="http://schemas.openxmlformats.org/officeDocument/2006/relationships" r:id="rId15"/>
-            </a:rPr>
-            <a:t>XML</a:t>
-          </a:r>
-          <a:endParaRPr lang="en-US" sz="3000" kern="1200" baseline="0" dirty="0">
-            <a:solidFill>
-              <a:schemeClr val="bg1"/>
-            </a:solidFill>
-          </a:endParaRPr>
-        </a:p>
-      </dsp:txBody>
-      <dsp:txXfrm>
-        <a:off x="1586179" y="2719979"/>
-        <a:ext cx="970649" cy="582389"/>
-      </dsp:txXfrm>
-    </dsp:sp>
-    <dsp:sp modelId="{E764C87E-8B28-4142-AFAD-7059F40D1F83}">
-      <dsp:nvSpPr>
-        <dsp:cNvPr id="0" name=""/>
-        <dsp:cNvSpPr/>
-      </dsp:nvSpPr>
-      <dsp:spPr>
-        <a:xfrm>
-          <a:off x="2653893" y="2719979"/>
-          <a:ext cx="970649" cy="582389"/>
-        </a:xfrm>
-        <a:prstGeom prst="rect">
-          <a:avLst/>
-        </a:prstGeom>
-        <a:solidFill>
-          <a:schemeClr val="accent2"/>
-        </a:solidFill>
-        <a:ln w="19050" cap="flat" cmpd="sng" algn="ctr">
-          <a:solidFill>
-            <a:schemeClr val="lt1">
-              <a:hueOff val="0"/>
-              <a:satOff val="0"/>
-              <a:lumOff val="0"/>
-              <a:alphaOff val="0"/>
-            </a:schemeClr>
-          </a:solidFill>
-          <a:prstDash val="solid"/>
-        </a:ln>
-        <a:effectLst/>
-      </dsp:spPr>
-      <dsp:style>
-        <a:lnRef idx="2">
-          <a:scrgbClr r="0" g="0" b="0"/>
-        </a:lnRef>
-        <a:fillRef idx="1">
-          <a:scrgbClr r="0" g="0" b="0"/>
-        </a:fillRef>
-        <a:effectRef idx="0">
-          <a:scrgbClr r="0" g="0" b="0"/>
-        </a:effectRef>
-        <a:fontRef idx="minor">
-          <a:schemeClr val="lt1"/>
-        </a:fontRef>
-      </dsp:style>
-      <dsp:txBody>
-        <a:bodyPr spcFirstLastPara="0" vert="horz" wrap="square" lIns="91440" tIns="91440" rIns="91440" bIns="91440" numCol="1" spcCol="1270" anchor="ctr" anchorCtr="0">
-          <a:noAutofit/>
-        </a:bodyPr>
-        <a:lstStyle/>
-        <a:p>
-          <a:pPr lvl="0" algn="ctr" defTabSz="1066800" rtl="0">
-            <a:lnSpc>
-              <a:spcPct val="90000"/>
-            </a:lnSpc>
-            <a:spcBef>
-              <a:spcPct val="0"/>
-            </a:spcBef>
-            <a:spcAft>
-              <a:spcPct val="35000"/>
-            </a:spcAft>
-          </a:pPr>
-          <a:r>
-            <a:rPr lang="en-US" sz="2400" kern="1200" baseline="0" dirty="0" smtClean="0">
-              <a:solidFill>
-                <a:schemeClr val="bg1"/>
-              </a:solidFill>
-            </a:rPr>
-            <a:t>LINQ</a:t>
-          </a:r>
-          <a:endParaRPr lang="en-US" sz="2400" kern="1200" baseline="0" dirty="0">
-            <a:solidFill>
-              <a:schemeClr val="bg1"/>
-            </a:solidFill>
-          </a:endParaRPr>
-        </a:p>
-      </dsp:txBody>
-      <dsp:txXfrm>
-        <a:off x="2653893" y="2719979"/>
-        <a:ext cx="970649" cy="582389"/>
-      </dsp:txXfrm>
-    </dsp:sp>
-    <dsp:sp modelId="{A8CC9F3C-CB68-413F-A3D7-658524E77C9D}">
-      <dsp:nvSpPr>
-        <dsp:cNvPr id="0" name=""/>
-        <dsp:cNvSpPr/>
-      </dsp:nvSpPr>
-      <dsp:spPr>
-        <a:xfrm>
-          <a:off x="3721608" y="2719979"/>
-          <a:ext cx="970649" cy="582389"/>
-        </a:xfrm>
-        <a:prstGeom prst="rect">
-          <a:avLst/>
-        </a:prstGeom>
-        <a:solidFill>
-          <a:schemeClr val="accent2"/>
-        </a:solidFill>
-        <a:ln w="19050" cap="flat" cmpd="sng" algn="ctr">
-          <a:solidFill>
-            <a:schemeClr val="lt1">
-              <a:hueOff val="0"/>
-              <a:satOff val="0"/>
-              <a:lumOff val="0"/>
-              <a:alphaOff val="0"/>
-            </a:schemeClr>
-          </a:solidFill>
-          <a:prstDash val="solid"/>
-        </a:ln>
-        <a:effectLst/>
-      </dsp:spPr>
-      <dsp:style>
-        <a:lnRef idx="2">
-          <a:scrgbClr r="0" g="0" b="0"/>
-        </a:lnRef>
-        <a:fillRef idx="1">
-          <a:scrgbClr r="0" g="0" b="0"/>
-        </a:fillRef>
-        <a:effectRef idx="0">
-          <a:scrgbClr r="0" g="0" b="0"/>
-        </a:effectRef>
-        <a:fontRef idx="minor">
-          <a:schemeClr val="lt1"/>
-        </a:fontRef>
-      </dsp:style>
-      <dsp:txBody>
-        <a:bodyPr spcFirstLastPara="0" vert="horz" wrap="square" lIns="99060" tIns="99060" rIns="99060" bIns="99060" numCol="1" spcCol="1270" anchor="ctr" anchorCtr="0">
-          <a:noAutofit/>
-        </a:bodyPr>
-        <a:lstStyle/>
-        <a:p>
-          <a:pPr lvl="0" algn="ctr" defTabSz="1155700" rtl="0">
-            <a:lnSpc>
-              <a:spcPct val="90000"/>
-            </a:lnSpc>
-            <a:spcBef>
-              <a:spcPct val="0"/>
-            </a:spcBef>
-            <a:spcAft>
-              <a:spcPct val="35000"/>
-            </a:spcAft>
-          </a:pPr>
-          <a:r>
-            <a:rPr lang="en-US" sz="2600" kern="1200" baseline="0" dirty="0" smtClean="0">
-              <a:solidFill>
-                <a:schemeClr val="bg1"/>
-              </a:solidFill>
-              <a:hlinkClick xmlns:r="http://schemas.openxmlformats.org/officeDocument/2006/relationships" r:id="rId16"/>
-            </a:rPr>
-            <a:t>IKVM</a:t>
-          </a:r>
-          <a:endParaRPr lang="en-US" sz="2600" kern="1200" baseline="0" dirty="0">
-            <a:solidFill>
-              <a:schemeClr val="bg1"/>
-            </a:solidFill>
-          </a:endParaRPr>
-        </a:p>
-      </dsp:txBody>
-      <dsp:txXfrm>
-        <a:off x="3721608" y="2719979"/>
-        <a:ext cx="970649" cy="582389"/>
-      </dsp:txXfrm>
-    </dsp:sp>
-    <dsp:sp modelId="{A8EBF937-4741-4D32-A88D-036F10E6437F}">
-      <dsp:nvSpPr>
-        <dsp:cNvPr id="0" name=""/>
-        <dsp:cNvSpPr/>
-      </dsp:nvSpPr>
-      <dsp:spPr>
-        <a:xfrm>
-          <a:off x="518464" y="3399434"/>
-          <a:ext cx="970649" cy="582389"/>
-        </a:xfrm>
-        <a:prstGeom prst="rect">
-          <a:avLst/>
-        </a:prstGeom>
-        <a:solidFill>
-          <a:schemeClr val="accent2"/>
-        </a:solidFill>
-        <a:ln w="19050" cap="flat" cmpd="sng" algn="ctr">
-          <a:solidFill>
-            <a:schemeClr val="lt1">
-              <a:hueOff val="0"/>
-              <a:satOff val="0"/>
-              <a:lumOff val="0"/>
-              <a:alphaOff val="0"/>
-            </a:schemeClr>
-          </a:solidFill>
-          <a:prstDash val="solid"/>
-        </a:ln>
-        <a:effectLst/>
-      </dsp:spPr>
-      <dsp:style>
-        <a:lnRef idx="2">
-          <a:scrgbClr r="0" g="0" b="0"/>
-        </a:lnRef>
-        <a:fillRef idx="1">
-          <a:scrgbClr r="0" g="0" b="0"/>
-        </a:fillRef>
-        <a:effectRef idx="0">
-          <a:scrgbClr r="0" g="0" b="0"/>
-        </a:effectRef>
-        <a:fontRef idx="minor">
-          <a:schemeClr val="lt1"/>
-        </a:fontRef>
-      </dsp:style>
-      <dsp:txBody>
-        <a:bodyPr spcFirstLastPara="0" vert="horz" wrap="square" lIns="68580" tIns="68580" rIns="68580" bIns="68580" numCol="1" spcCol="1270" anchor="ctr" anchorCtr="0">
-          <a:noAutofit/>
-        </a:bodyPr>
-        <a:lstStyle/>
-        <a:p>
-          <a:pPr lvl="0" algn="ctr" defTabSz="800100" rtl="0">
-            <a:lnSpc>
-              <a:spcPct val="90000"/>
-            </a:lnSpc>
-            <a:spcBef>
-              <a:spcPct val="0"/>
-            </a:spcBef>
-            <a:spcAft>
-              <a:spcPct val="35000"/>
-            </a:spcAft>
-          </a:pPr>
-          <a:r>
-            <a:rPr lang="en-US" sz="1800" kern="1200" baseline="0" dirty="0" smtClean="0">
-              <a:solidFill>
-                <a:schemeClr val="bg1"/>
-              </a:solidFill>
-              <a:hlinkClick xmlns:r="http://schemas.openxmlformats.org/officeDocument/2006/relationships" r:id="rId17"/>
-            </a:rPr>
-            <a:t>SQL Server</a:t>
-          </a:r>
-          <a:endParaRPr lang="en-US" sz="1800" kern="1200" baseline="0" dirty="0">
-            <a:solidFill>
-              <a:schemeClr val="bg1"/>
-            </a:solidFill>
-          </a:endParaRPr>
-        </a:p>
-      </dsp:txBody>
-      <dsp:txXfrm>
-        <a:off x="518464" y="3399434"/>
-        <a:ext cx="970649" cy="582389"/>
-      </dsp:txXfrm>
-    </dsp:sp>
-    <dsp:sp modelId="{1B91DF7A-8D21-412E-8DAE-E791BD6047FE}">
-      <dsp:nvSpPr>
-        <dsp:cNvPr id="0" name=""/>
-        <dsp:cNvSpPr/>
-      </dsp:nvSpPr>
-      <dsp:spPr>
-        <a:xfrm>
-          <a:off x="1586179" y="3399434"/>
-          <a:ext cx="970649" cy="582389"/>
-        </a:xfrm>
-        <a:prstGeom prst="rect">
-          <a:avLst/>
-        </a:prstGeom>
-        <a:solidFill>
-          <a:schemeClr val="accent2"/>
-        </a:solidFill>
-        <a:ln w="19050" cap="flat" cmpd="sng" algn="ctr">
-          <a:solidFill>
-            <a:schemeClr val="lt1">
-              <a:hueOff val="0"/>
-              <a:satOff val="0"/>
-              <a:lumOff val="0"/>
-              <a:alphaOff val="0"/>
-            </a:schemeClr>
-          </a:solidFill>
-          <a:prstDash val="solid"/>
-        </a:ln>
-        <a:effectLst/>
-      </dsp:spPr>
-      <dsp:style>
-        <a:lnRef idx="2">
-          <a:scrgbClr r="0" g="0" b="0"/>
-        </a:lnRef>
-        <a:fillRef idx="1">
-          <a:scrgbClr r="0" g="0" b="0"/>
-        </a:fillRef>
-        <a:effectRef idx="0">
-          <a:scrgbClr r="0" g="0" b="0"/>
-        </a:effectRef>
-        <a:fontRef idx="minor">
-          <a:schemeClr val="lt1"/>
-        </a:fontRef>
-      </dsp:style>
-      <dsp:txBody>
-        <a:bodyPr spcFirstLastPara="0" vert="horz" wrap="square" lIns="53340" tIns="53340" rIns="53340" bIns="53340" numCol="1" spcCol="1270" anchor="ctr" anchorCtr="0">
-          <a:noAutofit/>
-        </a:bodyPr>
-        <a:lstStyle/>
-        <a:p>
-          <a:pPr lvl="0" algn="ctr" defTabSz="622300" rtl="0">
-            <a:lnSpc>
-              <a:spcPct val="90000"/>
-            </a:lnSpc>
-            <a:spcBef>
-              <a:spcPct val="0"/>
-            </a:spcBef>
-            <a:spcAft>
-              <a:spcPct val="35000"/>
-            </a:spcAft>
-          </a:pPr>
-          <a:r>
-            <a:rPr lang="en-US" sz="1400" kern="1200" baseline="0" dirty="0" smtClean="0">
-              <a:solidFill>
-                <a:schemeClr val="bg1"/>
-              </a:solidFill>
-              <a:hlinkClick xmlns:r="http://schemas.openxmlformats.org/officeDocument/2006/relationships" r:id="rId18"/>
-            </a:rPr>
-            <a:t>SQL Server with EF</a:t>
-          </a:r>
-          <a:endParaRPr lang="en-US" sz="1400" kern="1200" baseline="0" dirty="0">
-            <a:solidFill>
-              <a:schemeClr val="bg1"/>
-            </a:solidFill>
-          </a:endParaRPr>
-        </a:p>
-      </dsp:txBody>
-      <dsp:txXfrm>
-        <a:off x="1586179" y="3399434"/>
-        <a:ext cx="970649" cy="582389"/>
-      </dsp:txXfrm>
-    </dsp:sp>
-    <dsp:sp modelId="{2898482B-73DB-448B-A915-359B88204C09}">
-      <dsp:nvSpPr>
-        <dsp:cNvPr id="0" name=""/>
-        <dsp:cNvSpPr/>
-      </dsp:nvSpPr>
-      <dsp:spPr>
-        <a:xfrm>
-          <a:off x="2653893" y="3399434"/>
-          <a:ext cx="970649" cy="582389"/>
-        </a:xfrm>
-        <a:prstGeom prst="rect">
-          <a:avLst/>
-        </a:prstGeom>
-        <a:solidFill>
-          <a:schemeClr val="accent2"/>
-        </a:solidFill>
-        <a:ln w="19050" cap="flat" cmpd="sng" algn="ctr">
-          <a:solidFill>
-            <a:schemeClr val="lt1">
-              <a:hueOff val="0"/>
-              <a:satOff val="0"/>
-              <a:lumOff val="0"/>
-              <a:alphaOff val="0"/>
-            </a:schemeClr>
-          </a:solidFill>
-          <a:prstDash val="solid"/>
-        </a:ln>
-        <a:effectLst/>
-      </dsp:spPr>
-      <dsp:style>
-        <a:lnRef idx="2">
-          <a:scrgbClr r="0" g="0" b="0"/>
-        </a:lnRef>
-        <a:fillRef idx="1">
-          <a:scrgbClr r="0" g="0" b="0"/>
-        </a:fillRef>
-        <a:effectRef idx="0">
-          <a:scrgbClr r="0" g="0" b="0"/>
-        </a:effectRef>
-        <a:fontRef idx="minor">
-          <a:schemeClr val="lt1"/>
-        </a:fontRef>
-      </dsp:style>
-      <dsp:txBody>
-        <a:bodyPr spcFirstLastPara="0" vert="horz" wrap="square" lIns="91440" tIns="91440" rIns="91440" bIns="91440" numCol="1" spcCol="1270" anchor="ctr" anchorCtr="0">
-          <a:noAutofit/>
-        </a:bodyPr>
-        <a:lstStyle/>
-        <a:p>
-          <a:pPr lvl="0" algn="ctr" defTabSz="1066800" rtl="0">
-            <a:lnSpc>
-              <a:spcPct val="90000"/>
-            </a:lnSpc>
-            <a:spcBef>
-              <a:spcPct val="0"/>
-            </a:spcBef>
-            <a:spcAft>
-              <a:spcPct val="35000"/>
-            </a:spcAft>
-          </a:pPr>
-          <a:r>
-            <a:rPr lang="en-US" sz="2400" kern="1200" baseline="0" dirty="0" smtClean="0">
-              <a:solidFill>
-                <a:schemeClr val="bg1"/>
-              </a:solidFill>
-              <a:hlinkClick xmlns:r="http://schemas.openxmlformats.org/officeDocument/2006/relationships" r:id="rId19"/>
-            </a:rPr>
-            <a:t>XAML</a:t>
-          </a:r>
-          <a:endParaRPr lang="en-US" sz="2400" kern="1200" baseline="0" dirty="0">
-            <a:solidFill>
-              <a:schemeClr val="bg1"/>
-            </a:solidFill>
-          </a:endParaRPr>
-        </a:p>
-      </dsp:txBody>
-      <dsp:txXfrm>
-        <a:off x="2653893" y="3399434"/>
-        <a:ext cx="970649" cy="582389"/>
-      </dsp:txXfrm>
-    </dsp:sp>
-    <dsp:sp modelId="{53BF552C-963A-4801-B804-BB298B08F019}">
-      <dsp:nvSpPr>
-        <dsp:cNvPr id="0" name=""/>
-        <dsp:cNvSpPr/>
-      </dsp:nvSpPr>
-      <dsp:spPr>
-        <a:xfrm>
-          <a:off x="3721608" y="3399434"/>
-          <a:ext cx="970649" cy="582389"/>
-        </a:xfrm>
-        <a:prstGeom prst="rect">
-          <a:avLst/>
-        </a:prstGeom>
-        <a:solidFill>
-          <a:schemeClr val="accent2"/>
-        </a:solidFill>
-        <a:ln w="19050" cap="flat" cmpd="sng" algn="ctr">
-          <a:solidFill>
-            <a:schemeClr val="lt1">
-              <a:hueOff val="0"/>
-              <a:satOff val="0"/>
-              <a:lumOff val="0"/>
-              <a:alphaOff val="0"/>
-            </a:schemeClr>
-          </a:solidFill>
-          <a:prstDash val="solid"/>
-        </a:ln>
-        <a:effectLst/>
-      </dsp:spPr>
-      <dsp:style>
-        <a:lnRef idx="2">
-          <a:scrgbClr r="0" g="0" b="0"/>
-        </a:lnRef>
-        <a:fillRef idx="1">
-          <a:scrgbClr r="0" g="0" b="0"/>
-        </a:fillRef>
-        <a:effectRef idx="0">
-          <a:scrgbClr r="0" g="0" b="0"/>
-        </a:effectRef>
-        <a:fontRef idx="minor">
-          <a:schemeClr val="lt1"/>
-        </a:fontRef>
-      </dsp:style>
-      <dsp:txBody>
-        <a:bodyPr spcFirstLastPara="0" vert="horz" wrap="square" lIns="68580" tIns="68580" rIns="68580" bIns="68580" numCol="1" spcCol="1270" anchor="ctr" anchorCtr="0">
-          <a:noAutofit/>
-        </a:bodyPr>
-        <a:lstStyle/>
-        <a:p>
-          <a:pPr lvl="0" algn="ctr" defTabSz="800100" rtl="0">
-            <a:lnSpc>
-              <a:spcPct val="90000"/>
-            </a:lnSpc>
-            <a:spcBef>
-              <a:spcPct val="0"/>
-            </a:spcBef>
-            <a:spcAft>
-              <a:spcPct val="35000"/>
-            </a:spcAft>
-          </a:pPr>
-          <a:r>
-            <a:rPr lang="en-US" sz="1800" kern="1200" baseline="0" dirty="0" smtClean="0">
-              <a:solidFill>
-                <a:schemeClr val="bg1"/>
-              </a:solidFill>
-              <a:hlinkClick xmlns:r="http://schemas.openxmlformats.org/officeDocument/2006/relationships" r:id="rId20"/>
-            </a:rPr>
-            <a:t>Hadoop</a:t>
-          </a:r>
-          <a:endParaRPr lang="en-US" sz="1800" kern="1200" baseline="0" dirty="0">
-            <a:solidFill>
-              <a:schemeClr val="bg1"/>
-            </a:solidFill>
-          </a:endParaRPr>
-        </a:p>
-      </dsp:txBody>
-      <dsp:txXfrm>
-        <a:off x="3721608" y="3399434"/>
-        <a:ext cx="970649" cy="582389"/>
-      </dsp:txXfrm>
-    </dsp:sp>
-    <dsp:sp modelId="{DF362DCF-95D1-490C-A218-2464D73F29DE}">
-      <dsp:nvSpPr>
-        <dsp:cNvPr id="0" name=""/>
-        <dsp:cNvSpPr/>
-      </dsp:nvSpPr>
-      <dsp:spPr>
-        <a:xfrm>
-          <a:off x="518464" y="4078889"/>
-          <a:ext cx="970649" cy="582389"/>
-        </a:xfrm>
-        <a:prstGeom prst="rect">
-          <a:avLst/>
-        </a:prstGeom>
-        <a:solidFill>
-          <a:schemeClr val="accent2"/>
-        </a:solidFill>
-        <a:ln w="19050" cap="flat" cmpd="sng" algn="ctr">
-          <a:solidFill>
-            <a:schemeClr val="lt1">
-              <a:hueOff val="0"/>
-              <a:satOff val="0"/>
-              <a:lumOff val="0"/>
-              <a:alphaOff val="0"/>
-            </a:schemeClr>
-          </a:solidFill>
-          <a:prstDash val="solid"/>
-        </a:ln>
-        <a:effectLst/>
-      </dsp:spPr>
-      <dsp:style>
-        <a:lnRef idx="2">
-          <a:scrgbClr r="0" g="0" b="0"/>
-        </a:lnRef>
-        <a:fillRef idx="1">
-          <a:scrgbClr r="0" g="0" b="0"/>
-        </a:fillRef>
-        <a:effectRef idx="0">
-          <a:scrgbClr r="0" g="0" b="0"/>
-        </a:effectRef>
-        <a:fontRef idx="minor">
-          <a:schemeClr val="lt1"/>
-        </a:fontRef>
-      </dsp:style>
-      <dsp:txBody>
-        <a:bodyPr spcFirstLastPara="0" vert="horz" wrap="square" lIns="87630" tIns="87630" rIns="87630" bIns="87630" numCol="1" spcCol="1270" anchor="ctr" anchorCtr="0">
-          <a:noAutofit/>
-        </a:bodyPr>
-        <a:lstStyle/>
-        <a:p>
-          <a:pPr lvl="0" algn="ctr" defTabSz="1022350" rtl="0">
-            <a:lnSpc>
-              <a:spcPct val="90000"/>
-            </a:lnSpc>
-            <a:spcBef>
-              <a:spcPct val="0"/>
-            </a:spcBef>
-            <a:spcAft>
-              <a:spcPct val="35000"/>
-            </a:spcAft>
-          </a:pPr>
-          <a:r>
-            <a:rPr lang="en-US" sz="2300" kern="1200" baseline="0" dirty="0" smtClean="0">
-              <a:solidFill>
-                <a:schemeClr val="bg1"/>
-              </a:solidFill>
-            </a:rPr>
-            <a:t>WSDL</a:t>
-          </a:r>
-          <a:endParaRPr lang="en-US" sz="2300" kern="1200" baseline="0" dirty="0">
-            <a:solidFill>
-              <a:schemeClr val="bg1"/>
-            </a:solidFill>
-          </a:endParaRPr>
-        </a:p>
-      </dsp:txBody>
-      <dsp:txXfrm>
-        <a:off x="518464" y="4078889"/>
-        <a:ext cx="970649" cy="582389"/>
-      </dsp:txXfrm>
-    </dsp:sp>
-    <dsp:sp modelId="{28162803-DF42-445D-9DA6-64E946932B3C}">
-      <dsp:nvSpPr>
-        <dsp:cNvPr id="0" name=""/>
-        <dsp:cNvSpPr/>
-      </dsp:nvSpPr>
-      <dsp:spPr>
-        <a:xfrm>
-          <a:off x="1586179" y="4078889"/>
-          <a:ext cx="970649" cy="582389"/>
-        </a:xfrm>
-        <a:prstGeom prst="rect">
-          <a:avLst/>
-        </a:prstGeom>
-        <a:solidFill>
-          <a:schemeClr val="accent2"/>
-        </a:solidFill>
-        <a:ln w="19050" cap="flat" cmpd="sng" algn="ctr">
-          <a:solidFill>
-            <a:schemeClr val="lt1">
-              <a:hueOff val="0"/>
-              <a:satOff val="0"/>
-              <a:lumOff val="0"/>
-              <a:alphaOff val="0"/>
-            </a:schemeClr>
-          </a:solidFill>
-          <a:prstDash val="solid"/>
-        </a:ln>
-        <a:effectLst/>
-      </dsp:spPr>
-      <dsp:style>
-        <a:lnRef idx="2">
-          <a:scrgbClr r="0" g="0" b="0"/>
-        </a:lnRef>
-        <a:fillRef idx="1">
-          <a:scrgbClr r="0" g="0" b="0"/>
-        </a:fillRef>
-        <a:effectRef idx="0">
-          <a:scrgbClr r="0" g="0" b="0"/>
-        </a:effectRef>
-        <a:fontRef idx="minor">
-          <a:schemeClr val="lt1"/>
-        </a:fontRef>
-      </dsp:style>
-      <dsp:txBody>
-        <a:bodyPr spcFirstLastPara="0" vert="horz" wrap="square" lIns="83820" tIns="83820" rIns="83820" bIns="83820" numCol="1" spcCol="1270" anchor="ctr" anchorCtr="0">
-          <a:noAutofit/>
-        </a:bodyPr>
-        <a:lstStyle/>
-        <a:p>
-          <a:pPr lvl="0" algn="ctr" defTabSz="977900" rtl="0">
-            <a:lnSpc>
-              <a:spcPct val="90000"/>
-            </a:lnSpc>
-            <a:spcBef>
-              <a:spcPct val="0"/>
-            </a:spcBef>
-            <a:spcAft>
-              <a:spcPct val="35000"/>
-            </a:spcAft>
-          </a:pPr>
-          <a:r>
-            <a:rPr lang="en-US" sz="2200" kern="1200" baseline="0" dirty="0" smtClean="0">
-              <a:solidFill>
-                <a:schemeClr val="bg1"/>
-              </a:solidFill>
-              <a:hlinkClick xmlns:r="http://schemas.openxmlformats.org/officeDocument/2006/relationships" r:id="rId21"/>
-            </a:rPr>
-            <a:t>OData</a:t>
-          </a:r>
-          <a:endParaRPr lang="en-US" sz="2200" kern="1200" baseline="0" dirty="0">
-            <a:solidFill>
-              <a:schemeClr val="bg1"/>
-            </a:solidFill>
-          </a:endParaRPr>
-        </a:p>
-      </dsp:txBody>
-      <dsp:txXfrm>
-        <a:off x="1586179" y="4078889"/>
-        <a:ext cx="970649" cy="582389"/>
-      </dsp:txXfrm>
-    </dsp:sp>
-    <dsp:sp modelId="{9B80A308-CEBD-416D-A1D4-D50030FF1E05}">
-      <dsp:nvSpPr>
-        <dsp:cNvPr id="0" name=""/>
-        <dsp:cNvSpPr/>
-      </dsp:nvSpPr>
-      <dsp:spPr>
-        <a:xfrm>
-          <a:off x="2653893" y="4078889"/>
-          <a:ext cx="970649" cy="582389"/>
-        </a:xfrm>
-        <a:prstGeom prst="rect">
-          <a:avLst/>
-        </a:prstGeom>
-        <a:solidFill>
-          <a:schemeClr val="accent2"/>
-        </a:solidFill>
-        <a:ln w="19050" cap="flat" cmpd="sng" algn="ctr">
-          <a:solidFill>
-            <a:schemeClr val="lt1">
-              <a:hueOff val="0"/>
-              <a:satOff val="0"/>
-              <a:lumOff val="0"/>
-              <a:alphaOff val="0"/>
-            </a:schemeClr>
-          </a:solidFill>
-          <a:prstDash val="solid"/>
-        </a:ln>
-        <a:effectLst/>
-      </dsp:spPr>
-      <dsp:style>
-        <a:lnRef idx="2">
-          <a:scrgbClr r="0" g="0" b="0"/>
-        </a:lnRef>
-        <a:fillRef idx="1">
-          <a:scrgbClr r="0" g="0" b="0"/>
-        </a:fillRef>
-        <a:effectRef idx="0">
-          <a:scrgbClr r="0" g="0" b="0"/>
-        </a:effectRef>
-        <a:fontRef idx="minor">
-          <a:schemeClr val="lt1"/>
-        </a:fontRef>
-      </dsp:style>
-      <dsp:txBody>
-        <a:bodyPr spcFirstLastPara="0" vert="horz" wrap="square" lIns="87630" tIns="87630" rIns="87630" bIns="87630" numCol="1" spcCol="1270" anchor="ctr" anchorCtr="0">
-          <a:noAutofit/>
-        </a:bodyPr>
-        <a:lstStyle/>
-        <a:p>
-          <a:pPr lvl="0" algn="ctr" defTabSz="1022350" rtl="0">
-            <a:lnSpc>
-              <a:spcPct val="90000"/>
-            </a:lnSpc>
-            <a:spcBef>
-              <a:spcPct val="0"/>
-            </a:spcBef>
-            <a:spcAft>
-              <a:spcPct val="35000"/>
-            </a:spcAft>
-          </a:pPr>
-          <a:r>
-            <a:rPr lang="en-US" sz="2300" kern="1200" baseline="0" dirty="0" smtClean="0">
-              <a:solidFill>
-                <a:schemeClr val="bg1"/>
-              </a:solidFill>
-              <a:hlinkClick xmlns:r="http://schemas.openxmlformats.org/officeDocument/2006/relationships" r:id="rId22"/>
-            </a:rPr>
-            <a:t>Apiary</a:t>
-          </a:r>
-          <a:endParaRPr lang="en-US" sz="2300" kern="1200" baseline="0" dirty="0">
-            <a:solidFill>
-              <a:schemeClr val="bg1"/>
-            </a:solidFill>
-          </a:endParaRPr>
-        </a:p>
-      </dsp:txBody>
-      <dsp:txXfrm>
-        <a:off x="2653893" y="4078889"/>
-        <a:ext cx="970649" cy="582389"/>
-      </dsp:txXfrm>
-    </dsp:sp>
-    <dsp:sp modelId="{6600B78B-B0DF-4F9A-AAA1-1BD4CEDF8FFA}">
-      <dsp:nvSpPr>
-        <dsp:cNvPr id="0" name=""/>
-        <dsp:cNvSpPr/>
-      </dsp:nvSpPr>
-      <dsp:spPr>
-        <a:xfrm>
-          <a:off x="3721608" y="4078889"/>
-          <a:ext cx="970649" cy="582389"/>
-        </a:xfrm>
-        <a:prstGeom prst="rect">
-          <a:avLst/>
-        </a:prstGeom>
-        <a:solidFill>
-          <a:schemeClr val="accent2"/>
-        </a:solidFill>
-        <a:ln w="19050" cap="flat" cmpd="sng" algn="ctr">
-          <a:solidFill>
-            <a:schemeClr val="lt1">
-              <a:hueOff val="0"/>
-              <a:satOff val="0"/>
-              <a:lumOff val="0"/>
-              <a:alphaOff val="0"/>
-            </a:schemeClr>
-          </a:solidFill>
-          <a:prstDash val="solid"/>
-        </a:ln>
-        <a:effectLst/>
-      </dsp:spPr>
-      <dsp:style>
-        <a:lnRef idx="2">
-          <a:scrgbClr r="0" g="0" b="0"/>
-        </a:lnRef>
-        <a:fillRef idx="1">
-          <a:scrgbClr r="0" g="0" b="0"/>
-        </a:fillRef>
-        <a:effectRef idx="0">
-          <a:scrgbClr r="0" g="0" b="0"/>
-        </a:effectRef>
-        <a:fontRef idx="minor">
-          <a:schemeClr val="lt1"/>
-        </a:fontRef>
-      </dsp:style>
-      <dsp:txBody>
-        <a:bodyPr spcFirstLastPara="0" vert="horz" wrap="square" lIns="60960" tIns="60960" rIns="60960" bIns="60960" numCol="1" spcCol="1270" anchor="ctr" anchorCtr="0">
-          <a:noAutofit/>
-        </a:bodyPr>
-        <a:lstStyle/>
-        <a:p>
-          <a:pPr lvl="0" algn="ctr" defTabSz="711200" rtl="0">
-            <a:lnSpc>
-              <a:spcPct val="90000"/>
-            </a:lnSpc>
-            <a:spcBef>
-              <a:spcPct val="0"/>
-            </a:spcBef>
-            <a:spcAft>
-              <a:spcPct val="35000"/>
-            </a:spcAft>
-          </a:pPr>
-          <a:r>
-            <a:rPr lang="en-US" sz="1600" kern="1200" baseline="0" dirty="0" smtClean="0">
-              <a:solidFill>
-                <a:schemeClr val="bg1"/>
-              </a:solidFill>
-            </a:rPr>
-            <a:t>Facebook</a:t>
-          </a:r>
-          <a:endParaRPr lang="en-US" sz="1600" kern="1200" baseline="0" dirty="0">
-            <a:solidFill>
-              <a:schemeClr val="bg1"/>
-            </a:solidFill>
-          </a:endParaRPr>
-        </a:p>
-      </dsp:txBody>
-      <dsp:txXfrm>
-        <a:off x="3721608" y="4078889"/>
-        <a:ext cx="970649" cy="582389"/>
-      </dsp:txXfrm>
-    </dsp:sp>
   </dsp:spTree>
 </dsp:drawing>
 </file>
@@ -19240,11 +16069,7 @@
           <a:p>
             <a:r>
               <a:rPr lang="en-US" dirty="0" smtClean="0"/>
-              <a:t>Why do we need </a:t>
-            </a:r>
-            <a:r>
-              <a:rPr lang="en-US" dirty="0" smtClean="0"/>
-              <a:t>type providers?</a:t>
+              <a:t>Why do we need type providers?</a:t>
             </a:r>
             <a:endParaRPr lang="en-US" dirty="0"/>
           </a:p>
@@ -19501,11 +16326,7 @@
           <a:p>
             <a:r>
               <a:rPr lang="en-US" dirty="0" smtClean="0"/>
-              <a:t>Why do we need </a:t>
-            </a:r>
-            <a:r>
-              <a:rPr lang="en-US" dirty="0" smtClean="0"/>
-              <a:t>type providers?</a:t>
+              <a:t>Why do we need type providers?</a:t>
             </a:r>
             <a:endParaRPr lang="en-US" dirty="0"/>
           </a:p>
@@ -19832,15 +16653,7 @@
                   <a:schemeClr val="accent2"/>
                 </a:solidFill>
               </a:rPr>
-              <a:t>Simplicity</a:t>
-            </a:r>
-            <a:r>
-              <a:rPr lang="en-US" sz="2800" dirty="0" smtClean="0">
-                <a:solidFill>
-                  <a:schemeClr val="accent2"/>
-                </a:solidFill>
-              </a:rPr>
-              <a:t>, Elegance, Tooling</a:t>
+              <a:t>Simplicity, Elegance, Tooling</a:t>
             </a:r>
             <a:endParaRPr lang="en-US" sz="2800" dirty="0">
               <a:solidFill>
@@ -19887,17 +16700,7 @@
                   </a:schemeClr>
                 </a:solidFill>
               </a:rPr>
-              <a:t>“</a:t>
-            </a:r>
-            <a:r>
-              <a:rPr lang="en-US" dirty="0" smtClean="0">
-                <a:solidFill>
-                  <a:schemeClr val="accent4">
-                    <a:lumMod val="50000"/>
-                  </a:schemeClr>
-                </a:solidFill>
-              </a:rPr>
-              <a:t>Type Providers are about replacing our conventional notion of a “library” with a provider model. This allows a type provider to project an external information source into F# and makes it </a:t>
+              <a:t>“Type Providers are about replacing our conventional notion of a “library” with a provider model. This allows a type provider to project an external information source into F# and makes it </a:t>
             </a:r>
             <a:r>
               <a:rPr lang="en-US" b="1" dirty="0" smtClean="0">
@@ -20589,11 +17392,6 @@
               </a:rPr>
               <a:t>Information-richness of external data sources</a:t>
             </a:r>
-            <a:endParaRPr lang="en-US" sz="2800" dirty="0">
-              <a:solidFill>
-                <a:schemeClr val="accent2"/>
-              </a:solidFill>
-            </a:endParaRPr>
           </a:p>
         </p:txBody>
       </p:sp>

</xml_diff>

<commit_message>
Final changes for oredev. :)
</commit_message>
<xml_diff>
--- a/Type Providers/Type Providers.pptx
+++ b/Type Providers/Type Providers.pptx
@@ -4227,9 +4227,9 @@
                 </a:schemeClr>
               </a:solidFill>
             </a:rPr>
-            <a:t>Parallelization</a:t>
+            <a:t>Interoperability with .NET</a:t>
           </a:r>
-          <a:endParaRPr lang="en-US" b="1">
+          <a:endParaRPr lang="en-US" b="1" dirty="0">
             <a:solidFill>
               <a:schemeClr val="accent4">
                 <a:lumMod val="50000"/>
@@ -4327,7 +4327,7 @@
                 </a:schemeClr>
               </a:solidFill>
             </a:rPr>
-            <a:t>Interoperability with .NET</a:t>
+            <a:t>Parallelization</a:t>
           </a:r>
           <a:endParaRPr lang="en-US" b="1" dirty="0">
             <a:solidFill>
@@ -10865,9 +10865,9 @@
                 </a:schemeClr>
               </a:solidFill>
             </a:rPr>
-            <a:t>Parallelization</a:t>
+            <a:t>Interoperability with .NET</a:t>
           </a:r>
-          <a:endParaRPr lang="en-US" sz="2500" b="1" kern="1200">
+          <a:endParaRPr lang="en-US" sz="2500" b="1" kern="1200" dirty="0">
             <a:solidFill>
               <a:schemeClr val="accent4">
                 <a:lumMod val="50000"/>
@@ -10974,7 +10974,7 @@
                 </a:schemeClr>
               </a:solidFill>
             </a:rPr>
-            <a:t>Interoperability with .NET</a:t>
+            <a:t>Parallelization</a:t>
           </a:r>
           <a:endParaRPr lang="en-US" sz="2500" b="1" kern="1200" dirty="0">
             <a:solidFill>
@@ -33061,7 +33061,7 @@
             <p:ph idx="1"/>
             <p:extLst>
               <p:ext uri="{D42A27DB-BD31-4B8C-83A1-F6EECF244321}">
-                <p14:modId xmlns:p14="http://schemas.microsoft.com/office/powerpoint/2010/main" val="1066504884"/>
+                <p14:modId xmlns:p14="http://schemas.microsoft.com/office/powerpoint/2010/main" val="1285425149"/>
               </p:ext>
             </p:extLst>
           </p:nvPr>

</xml_diff>